<commit_message>
Subo todo lo que hizo la Yami!!!
</commit_message>
<xml_diff>
--- a/Seguridad-Higiene/Trabajo de Higiene y Seguridad.pptx
+++ b/Seguridad-Higiene/Trabajo de Higiene y Seguridad.pptx
@@ -10,7 +10,6 @@
     <p:sldId id="258" r:id="rId4"/>
     <p:sldId id="260" r:id="rId5"/>
     <p:sldId id="261" r:id="rId6"/>
-    <p:sldId id="259" r:id="rId7"/>
   </p:sldIdLst>
   <p:sldSz cx="9144000" cy="6858000" type="screen4x3"/>
   <p:notesSz cx="6858000" cy="9144000"/>
@@ -3147,6 +3146,16 @@
           <a:lstStyle/>
           <a:p>
             <a:r>
+              <a:rPr lang="es-AR" b="1" dirty="0" smtClean="0">
+                <a:solidFill>
+                  <a:schemeClr val="tx2">
+                    <a:lumMod val="75000"/>
+                  </a:schemeClr>
+                </a:solidFill>
+              </a:rPr>
+              <a:t>Higiene </a:t>
+            </a:r>
+            <a:r>
               <a:rPr lang="es-AR" b="1" dirty="0">
                 <a:solidFill>
                   <a:schemeClr val="tx2">
@@ -3154,7 +3163,7 @@
                   </a:schemeClr>
                 </a:solidFill>
               </a:rPr>
-              <a:t>Trabajo de Higiene y Seguridad</a:t>
+              <a:t>y Seguridad</a:t>
             </a:r>
             <a:r>
               <a:rPr lang="es-AR" b="1" dirty="0"/>
@@ -3451,7 +3460,7 @@
           <p:nvPr>
             <p:extLst>
               <p:ext uri="{D42A27DB-BD31-4B8C-83A1-F6EECF244321}">
-                <p14:modId xmlns:p14="http://schemas.microsoft.com/office/powerpoint/2010/main" val="4259681347"/>
+                <p14:modId xmlns:p14="http://schemas.microsoft.com/office/powerpoint/2010/main" val="1728996976"/>
               </p:ext>
             </p:extLst>
           </p:nvPr>
@@ -3657,10 +3666,16 @@
                         <a:t>Combustibles </a:t>
                       </a:r>
                       <a:r>
-                        <a:rPr lang="pt-BR" sz="1600" u="none" strike="noStrike" dirty="0" err="1" smtClean="0">
-                          <a:effectLst/>
-                        </a:rPr>
-                        <a:t>líquidos:pinturas</a:t>
+                        <a:rPr lang="pt-BR" sz="1600" u="none" strike="noStrike" dirty="0" smtClean="0">
+                          <a:effectLst/>
+                        </a:rPr>
+                        <a:t>líquidos</a:t>
+                      </a:r>
+                      <a:r>
+                        <a:rPr lang="pt-BR" sz="1600" u="none" strike="noStrike" dirty="0" smtClean="0">
+                          <a:effectLst/>
+                        </a:rPr>
+                        <a:t>: pinturas</a:t>
                       </a:r>
                       <a:r>
                         <a:rPr lang="pt-BR" sz="1600" u="none" strike="noStrike" dirty="0">
@@ -3832,7 +3847,12 @@
             <p:ph type="title"/>
           </p:nvPr>
         </p:nvSpPr>
-        <p:spPr/>
+        <p:spPr>
+          <a:xfrm>
+            <a:off x="457200" y="274638"/>
+            <a:ext cx="8229600" cy="778098"/>
+          </a:xfrm>
+        </p:spPr>
         <p:txBody>
           <a:bodyPr/>
           <a:lstStyle/>
@@ -3845,7 +3865,7 @@
                   </a:schemeClr>
                 </a:solidFill>
               </a:rPr>
-              <a:t>Extintores</a:t>
+              <a:t>Tipos de Extintores</a:t>
             </a:r>
             <a:endParaRPr lang="es-AR" b="1" dirty="0">
               <a:solidFill>
@@ -3857,65 +3877,23 @@
           </a:p>
         </p:txBody>
       </p:sp>
-      <p:sp>
-        <p:nvSpPr>
-          <p:cNvPr id="3" name="2 Marcador de contenido"/>
-          <p:cNvSpPr>
-            <a:spLocks noGrp="1"/>
-          </p:cNvSpPr>
-          <p:nvPr>
-            <p:ph idx="1"/>
-          </p:nvPr>
-        </p:nvSpPr>
-        <p:spPr>
-          <a:xfrm>
-            <a:off x="457200" y="1268761"/>
-            <a:ext cx="8229600" cy="504055"/>
-          </a:xfrm>
-        </p:spPr>
-        <p:txBody>
-          <a:bodyPr>
-            <a:normAutofit fontScale="92500" lnSpcReduction="10000"/>
-          </a:bodyPr>
-          <a:lstStyle/>
-          <a:p>
-            <a:pPr marL="0" indent="0">
-              <a:buNone/>
-            </a:pPr>
-            <a:r>
-              <a:rPr lang="es-AR" sz="3000" dirty="0" smtClean="0">
-                <a:solidFill>
-                  <a:srgbClr val="FF0000"/>
-                </a:solidFill>
-              </a:rPr>
-              <a:t>Tipos Utilizados</a:t>
-            </a:r>
-          </a:p>
-          <a:p>
-            <a:pPr marL="0" indent="0">
-              <a:buNone/>
-            </a:pPr>
-            <a:endParaRPr lang="es-AR" dirty="0"/>
-          </a:p>
-        </p:txBody>
-      </p:sp>
       <p:graphicFrame>
         <p:nvGraphicFramePr>
-          <p:cNvPr id="6" name="5 Tabla"/>
+          <p:cNvPr id="4" name="3 Tabla"/>
           <p:cNvGraphicFramePr>
             <a:graphicFrameLocks noGrp="1"/>
           </p:cNvGraphicFramePr>
           <p:nvPr>
             <p:extLst>
               <p:ext uri="{D42A27DB-BD31-4B8C-83A1-F6EECF244321}">
-                <p14:modId xmlns:p14="http://schemas.microsoft.com/office/powerpoint/2010/main" val="1043801183"/>
+                <p14:modId xmlns:p14="http://schemas.microsoft.com/office/powerpoint/2010/main" val="1117355451"/>
               </p:ext>
             </p:extLst>
           </p:nvPr>
         </p:nvGraphicFramePr>
         <p:xfrm>
-          <a:off x="1043608" y="1772816"/>
-          <a:ext cx="7200800" cy="4890627"/>
+          <a:off x="1043608" y="1124744"/>
+          <a:ext cx="6349141" cy="5716457"/>
         </p:xfrm>
         <a:graphic>
           <a:graphicData uri="http://schemas.openxmlformats.org/drawingml/2006/table">
@@ -3924,12 +3902,12 @@
                 <a:tableStyleId>{5C22544A-7EE6-4342-B048-85BDC9FD1C3A}</a:tableStyleId>
               </a:tblPr>
               <a:tblGrid>
-                <a:gridCol w="1836839"/>
-                <a:gridCol w="2213000"/>
-                <a:gridCol w="1919888"/>
-                <a:gridCol w="1231073"/>
+                <a:gridCol w="1887789"/>
+                <a:gridCol w="2000643"/>
+                <a:gridCol w="1436792"/>
+                <a:gridCol w="1023917"/>
               </a:tblGrid>
-              <a:tr h="196705">
+              <a:tr h="377333">
                 <a:tc>
                   <a:txBody>
                     <a:bodyPr/>
@@ -3937,21 +3915,21 @@
                     <a:p>
                       <a:pPr algn="ctr" fontAlgn="ctr"/>
                       <a:r>
-                        <a:rPr lang="es-AR" sz="1400" b="1" u="none" strike="noStrike" dirty="0">
+                        <a:rPr lang="es-AR" sz="1200" b="1" u="none" strike="noStrike" dirty="0">
                           <a:effectLst/>
                         </a:rPr>
                         <a:t>Piso</a:t>
                       </a:r>
-                      <a:endParaRPr lang="es-AR" sz="1400" b="1" i="0" u="none" strike="noStrike" dirty="0">
-                        <a:solidFill>
-                          <a:srgbClr val="000000"/>
-                        </a:solidFill>
-                        <a:effectLst/>
-                        <a:latin typeface="Calibri"/>
-                      </a:endParaRPr>
-                    </a:p>
-                  </a:txBody>
-                  <a:tcPr marL="9525" marR="9525" marT="9525" marB="0" anchor="ctr"/>
+                      <a:endParaRPr lang="es-AR" sz="1200" b="1" i="0" u="none" strike="noStrike" dirty="0">
+                        <a:solidFill>
+                          <a:srgbClr val="000000"/>
+                        </a:solidFill>
+                        <a:effectLst/>
+                        <a:latin typeface="Calibri"/>
+                      </a:endParaRPr>
+                    </a:p>
+                  </a:txBody>
+                  <a:tcPr marL="7803" marR="7803" marT="7803" marB="0" anchor="ctr"/>
                 </a:tc>
                 <a:tc>
                   <a:txBody>
@@ -3960,21 +3938,21 @@
                     <a:p>
                       <a:pPr algn="ctr" fontAlgn="b"/>
                       <a:r>
-                        <a:rPr lang="es-AR" sz="1400" b="1" u="none" strike="noStrike" dirty="0">
+                        <a:rPr lang="es-AR" sz="1200" b="1" u="none" strike="noStrike" dirty="0">
                           <a:effectLst/>
                         </a:rPr>
                         <a:t>Sector</a:t>
                       </a:r>
-                      <a:endParaRPr lang="es-AR" sz="1400" b="1" i="0" u="none" strike="noStrike" dirty="0">
-                        <a:solidFill>
-                          <a:srgbClr val="000000"/>
-                        </a:solidFill>
-                        <a:effectLst/>
-                        <a:latin typeface="Calibri"/>
-                      </a:endParaRPr>
-                    </a:p>
-                  </a:txBody>
-                  <a:tcPr marL="9525" marR="9525" marT="9525" marB="0" anchor="b"/>
+                      <a:endParaRPr lang="es-AR" sz="1200" b="1" i="0" u="none" strike="noStrike" dirty="0">
+                        <a:solidFill>
+                          <a:srgbClr val="000000"/>
+                        </a:solidFill>
+                        <a:effectLst/>
+                        <a:latin typeface="Calibri"/>
+                      </a:endParaRPr>
+                    </a:p>
+                  </a:txBody>
+                  <a:tcPr marL="7803" marR="7803" marT="7803" marB="0" anchor="ctr"/>
                 </a:tc>
                 <a:tc>
                   <a:txBody>
@@ -3983,21 +3961,21 @@
                     <a:p>
                       <a:pPr algn="ctr" fontAlgn="b"/>
                       <a:r>
-                        <a:rPr lang="es-AR" sz="1400" b="1" u="none" strike="noStrike">
+                        <a:rPr lang="es-AR" sz="1200" b="1" u="none" strike="noStrike" dirty="0">
                           <a:effectLst/>
                         </a:rPr>
                         <a:t>Tipo Matafuego</a:t>
                       </a:r>
-                      <a:endParaRPr lang="es-AR" sz="1400" b="1" i="0" u="none" strike="noStrike">
-                        <a:solidFill>
-                          <a:srgbClr val="000000"/>
-                        </a:solidFill>
-                        <a:effectLst/>
-                        <a:latin typeface="Calibri"/>
-                      </a:endParaRPr>
-                    </a:p>
-                  </a:txBody>
-                  <a:tcPr marL="9525" marR="9525" marT="9525" marB="0" anchor="b"/>
+                      <a:endParaRPr lang="es-AR" sz="1200" b="1" i="0" u="none" strike="noStrike" dirty="0">
+                        <a:solidFill>
+                          <a:srgbClr val="000000"/>
+                        </a:solidFill>
+                        <a:effectLst/>
+                        <a:latin typeface="Calibri"/>
+                      </a:endParaRPr>
+                    </a:p>
+                  </a:txBody>
+                  <a:tcPr marL="7803" marR="7803" marT="7803" marB="0" anchor="ctr"/>
                 </a:tc>
                 <a:tc>
                   <a:txBody>
@@ -4006,24 +3984,93 @@
                     <a:p>
                       <a:pPr algn="ctr" fontAlgn="b"/>
                       <a:r>
-                        <a:rPr lang="es-AR" sz="1400" b="1" u="none" strike="noStrike" dirty="0">
+                        <a:rPr lang="es-AR" sz="1200" b="1" u="none" strike="noStrike" dirty="0">
                           <a:effectLst/>
                         </a:rPr>
                         <a:t>Cantidad</a:t>
                       </a:r>
-                      <a:endParaRPr lang="es-AR" sz="1400" b="1" i="0" u="none" strike="noStrike" dirty="0">
-                        <a:solidFill>
-                          <a:srgbClr val="000000"/>
-                        </a:solidFill>
-                        <a:effectLst/>
-                        <a:latin typeface="Calibri"/>
-                      </a:endParaRPr>
-                    </a:p>
-                  </a:txBody>
-                  <a:tcPr marL="9525" marR="9525" marT="9525" marB="0" anchor="b"/>
+                      <a:endParaRPr lang="es-AR" sz="1200" b="1" i="0" u="none" strike="noStrike" dirty="0">
+                        <a:solidFill>
+                          <a:srgbClr val="000000"/>
+                        </a:solidFill>
+                        <a:effectLst/>
+                        <a:latin typeface="Calibri"/>
+                      </a:endParaRPr>
+                    </a:p>
+                  </a:txBody>
+                  <a:tcPr marL="7803" marR="7803" marT="7803" marB="0" anchor="ctr"/>
                 </a:tc>
               </a:tr>
-              <a:tr h="281172">
+              <a:tr h="156068">
+                <a:tc rowSpan="4">
+                  <a:txBody>
+                    <a:bodyPr/>
+                    <a:lstStyle/>
+                    <a:p>
+                      <a:pPr algn="ctr" fontAlgn="ctr"/>
+                      <a:r>
+                        <a:rPr lang="es-AR" sz="1200" b="1" u="none" strike="noStrike" dirty="0">
+                          <a:effectLst/>
+                        </a:rPr>
+                        <a:t>Edificio Expedición</a:t>
+                      </a:r>
+                      <a:endParaRPr lang="es-AR" sz="1200" b="1" i="0" u="none" strike="noStrike" dirty="0">
+                        <a:solidFill>
+                          <a:srgbClr val="000000"/>
+                        </a:solidFill>
+                        <a:effectLst/>
+                        <a:latin typeface="Calibri"/>
+                      </a:endParaRPr>
+                    </a:p>
+                  </a:txBody>
+                  <a:tcPr marL="7803" marR="7803" marT="7803" marB="0" anchor="ctr"/>
+                </a:tc>
+                <a:tc>
+                  <a:txBody>
+                    <a:bodyPr/>
+                    <a:lstStyle/>
+                    <a:p>
+                      <a:pPr algn="l" fontAlgn="b"/>
+                      <a:r>
+                        <a:rPr lang="es-AR" sz="1200" u="none" strike="noStrike">
+                          <a:effectLst/>
+                        </a:rPr>
+                        <a:t>Producción</a:t>
+                      </a:r>
+                      <a:endParaRPr lang="es-AR" sz="1200" b="0" i="0" u="none" strike="noStrike">
+                        <a:solidFill>
+                          <a:srgbClr val="000000"/>
+                        </a:solidFill>
+                        <a:effectLst/>
+                        <a:latin typeface="Calibri"/>
+                      </a:endParaRPr>
+                    </a:p>
+                  </a:txBody>
+                  <a:tcPr marL="7803" marR="7803" marT="7803" marB="0" anchor="b"/>
+                </a:tc>
+                <a:tc>
+                  <a:txBody>
+                    <a:bodyPr/>
+                    <a:lstStyle/>
+                    <a:p>
+                      <a:pPr algn="l" fontAlgn="b"/>
+                      <a:r>
+                        <a:rPr lang="es-AR" sz="1200" u="none" strike="noStrike">
+                          <a:effectLst/>
+                        </a:rPr>
+                        <a:t>Clase ABC</a:t>
+                      </a:r>
+                      <a:endParaRPr lang="es-AR" sz="1200" b="0" i="0" u="none" strike="noStrike">
+                        <a:solidFill>
+                          <a:srgbClr val="000000"/>
+                        </a:solidFill>
+                        <a:effectLst/>
+                        <a:latin typeface="Calibri"/>
+                      </a:endParaRPr>
+                    </a:p>
+                  </a:txBody>
+                  <a:tcPr marL="7803" marR="7803" marT="7803" marB="0" anchor="b"/>
+                </a:tc>
                 <a:tc>
                   <a:txBody>
                     <a:bodyPr/>
@@ -4031,21 +4078,79 @@
                     <a:p>
                       <a:pPr algn="ctr" fontAlgn="b"/>
                       <a:r>
-                        <a:rPr lang="es-AR" sz="1400" b="1" u="none" strike="noStrike" dirty="0">
-                          <a:effectLst/>
-                        </a:rPr>
-                        <a:t>Edificio Expedición</a:t>
-                      </a:r>
-                      <a:endParaRPr lang="es-AR" sz="1400" b="1" i="0" u="none" strike="noStrike" dirty="0">
-                        <a:solidFill>
-                          <a:srgbClr val="000000"/>
-                        </a:solidFill>
-                        <a:effectLst/>
-                        <a:latin typeface="Calibri"/>
-                      </a:endParaRPr>
-                    </a:p>
-                  </a:txBody>
-                  <a:tcPr marL="9525" marR="9525" marT="9525" marB="0" anchor="b"/>
+                        <a:rPr lang="es-AR" sz="1200" u="none" strike="noStrike" dirty="0">
+                          <a:effectLst/>
+                        </a:rPr>
+                        <a:t>2</a:t>
+                      </a:r>
+                      <a:endParaRPr lang="es-AR" sz="1200" b="0" i="0" u="none" strike="noStrike" dirty="0">
+                        <a:solidFill>
+                          <a:srgbClr val="000000"/>
+                        </a:solidFill>
+                        <a:effectLst/>
+                        <a:latin typeface="Calibri"/>
+                      </a:endParaRPr>
+                    </a:p>
+                  </a:txBody>
+                  <a:tcPr marL="7803" marR="7803" marT="7803" marB="0" anchor="b"/>
+                </a:tc>
+              </a:tr>
+              <a:tr h="156068">
+                <a:tc vMerge="1">
+                  <a:txBody>
+                    <a:bodyPr/>
+                    <a:lstStyle/>
+                    <a:p>
+                      <a:endParaRPr lang="es-AR"/>
+                    </a:p>
+                  </a:txBody>
+                  <a:tcPr/>
+                </a:tc>
+                <a:tc>
+                  <a:txBody>
+                    <a:bodyPr/>
+                    <a:lstStyle/>
+                    <a:p>
+                      <a:pPr algn="l" fontAlgn="b"/>
+                      <a:r>
+                        <a:rPr lang="es-AR" sz="1200" u="none" strike="noStrike">
+                          <a:effectLst/>
+                        </a:rPr>
+                        <a:t>Depósito Producción</a:t>
+                      </a:r>
+                      <a:endParaRPr lang="es-AR" sz="1200" b="0" i="0" u="none" strike="noStrike">
+                        <a:solidFill>
+                          <a:srgbClr val="000000"/>
+                        </a:solidFill>
+                        <a:effectLst/>
+                        <a:latin typeface="Calibri"/>
+                      </a:endParaRPr>
+                    </a:p>
+                  </a:txBody>
+                  <a:tcPr marL="7803" marR="7803" marT="7803" marB="0" anchor="b"/>
+                </a:tc>
+                <a:tc>
+                  <a:txBody>
+                    <a:bodyPr/>
+                    <a:lstStyle/>
+                    <a:p>
+                      <a:pPr algn="l" fontAlgn="b"/>
+                      <a:r>
+                        <a:rPr lang="es-AR" sz="1200" u="none" strike="noStrike">
+                          <a:effectLst/>
+                        </a:rPr>
+                        <a:t>Clase ABC</a:t>
+                      </a:r>
+                      <a:endParaRPr lang="es-AR" sz="1200" b="0" i="0" u="none" strike="noStrike">
+                        <a:solidFill>
+                          <a:srgbClr val="000000"/>
+                        </a:solidFill>
+                        <a:effectLst/>
+                        <a:latin typeface="Calibri"/>
+                      </a:endParaRPr>
+                    </a:p>
+                  </a:txBody>
+                  <a:tcPr marL="7803" marR="7803" marT="7803" marB="0" anchor="b"/>
                 </a:tc>
                 <a:tc>
                   <a:txBody>
@@ -4054,10 +4159,172 @@
                     <a:p>
                       <a:pPr algn="ctr" fontAlgn="b"/>
                       <a:r>
+                        <a:rPr lang="es-AR" sz="1200" u="none" strike="noStrike">
+                          <a:effectLst/>
+                        </a:rPr>
+                        <a:t>1</a:t>
+                      </a:r>
+                      <a:endParaRPr lang="es-AR" sz="1200" b="0" i="0" u="none" strike="noStrike">
+                        <a:solidFill>
+                          <a:srgbClr val="000000"/>
+                        </a:solidFill>
+                        <a:effectLst/>
+                        <a:latin typeface="Calibri"/>
+                      </a:endParaRPr>
+                    </a:p>
+                  </a:txBody>
+                  <a:tcPr marL="7803" marR="7803" marT="7803" marB="0" anchor="b"/>
+                </a:tc>
+              </a:tr>
+              <a:tr h="156068">
+                <a:tc vMerge="1">
+                  <a:txBody>
+                    <a:bodyPr/>
+                    <a:lstStyle/>
+                    <a:p>
+                      <a:endParaRPr lang="es-AR"/>
+                    </a:p>
+                  </a:txBody>
+                  <a:tcPr/>
+                </a:tc>
+                <a:tc>
+                  <a:txBody>
+                    <a:bodyPr/>
+                    <a:lstStyle/>
+                    <a:p>
+                      <a:pPr algn="l" fontAlgn="b"/>
+                      <a:r>
+                        <a:rPr lang="es-AR" sz="1200" u="none" strike="noStrike">
+                          <a:effectLst/>
+                        </a:rPr>
+                        <a:t>Depósito Expedición</a:t>
+                      </a:r>
+                      <a:endParaRPr lang="es-AR" sz="1200" b="0" i="0" u="none" strike="noStrike">
+                        <a:solidFill>
+                          <a:srgbClr val="000000"/>
+                        </a:solidFill>
+                        <a:effectLst/>
+                        <a:latin typeface="Calibri"/>
+                      </a:endParaRPr>
+                    </a:p>
+                  </a:txBody>
+                  <a:tcPr marL="7803" marR="7803" marT="7803" marB="0" anchor="b"/>
+                </a:tc>
+                <a:tc>
+                  <a:txBody>
+                    <a:bodyPr/>
+                    <a:lstStyle/>
+                    <a:p>
+                      <a:pPr algn="l" fontAlgn="b"/>
+                      <a:r>
+                        <a:rPr lang="es-AR" sz="1200" u="none" strike="noStrike">
+                          <a:effectLst/>
+                        </a:rPr>
+                        <a:t>Clase ABC</a:t>
+                      </a:r>
+                      <a:endParaRPr lang="es-AR" sz="1200" b="0" i="0" u="none" strike="noStrike">
+                        <a:solidFill>
+                          <a:srgbClr val="000000"/>
+                        </a:solidFill>
+                        <a:effectLst/>
+                        <a:latin typeface="Calibri"/>
+                      </a:endParaRPr>
+                    </a:p>
+                  </a:txBody>
+                  <a:tcPr marL="7803" marR="7803" marT="7803" marB="0" anchor="b"/>
+                </a:tc>
+                <a:tc>
+                  <a:txBody>
+                    <a:bodyPr/>
+                    <a:lstStyle/>
+                    <a:p>
+                      <a:pPr algn="ctr" fontAlgn="b"/>
+                      <a:r>
+                        <a:rPr lang="es-AR" sz="1200" u="none" strike="noStrike">
+                          <a:effectLst/>
+                        </a:rPr>
+                        <a:t>1</a:t>
+                      </a:r>
+                      <a:endParaRPr lang="es-AR" sz="1200" b="0" i="0" u="none" strike="noStrike">
+                        <a:solidFill>
+                          <a:srgbClr val="000000"/>
+                        </a:solidFill>
+                        <a:effectLst/>
+                        <a:latin typeface="Calibri"/>
+                      </a:endParaRPr>
+                    </a:p>
+                  </a:txBody>
+                  <a:tcPr marL="7803" marR="7803" marT="7803" marB="0" anchor="b"/>
+                </a:tc>
+              </a:tr>
+              <a:tr h="156068">
+                <a:tc vMerge="1">
+                  <a:txBody>
+                    <a:bodyPr/>
+                    <a:lstStyle/>
+                    <a:p>
+                      <a:endParaRPr lang="es-AR"/>
+                    </a:p>
+                  </a:txBody>
+                  <a:tcPr/>
+                </a:tc>
+                <a:tc>
+                  <a:txBody>
+                    <a:bodyPr/>
+                    <a:lstStyle/>
+                    <a:p>
+                      <a:pPr algn="l" fontAlgn="b"/>
+                      <a:r>
+                        <a:rPr lang="es-AR" sz="1200" u="none" strike="noStrike">
+                          <a:effectLst/>
+                        </a:rPr>
+                        <a:t>kitchenette</a:t>
+                      </a:r>
+                      <a:endParaRPr lang="es-AR" sz="1200" b="0" i="0" u="none" strike="noStrike">
+                        <a:solidFill>
+                          <a:srgbClr val="000000"/>
+                        </a:solidFill>
+                        <a:effectLst/>
+                        <a:latin typeface="Calibri"/>
+                      </a:endParaRPr>
+                    </a:p>
+                  </a:txBody>
+                  <a:tcPr marL="7803" marR="7803" marT="7803" marB="0" anchor="b"/>
+                </a:tc>
+                <a:tc>
+                  <a:txBody>
+                    <a:bodyPr/>
+                    <a:lstStyle/>
+                    <a:p>
+                      <a:pPr algn="l" fontAlgn="b"/>
+                      <a:r>
+                        <a:rPr lang="es-AR" sz="1200" u="none" strike="noStrike">
+                          <a:effectLst/>
+                        </a:rPr>
+                        <a:t>Clase K</a:t>
+                      </a:r>
+                      <a:endParaRPr lang="es-AR" sz="1200" b="0" i="0" u="none" strike="noStrike">
+                        <a:solidFill>
+                          <a:srgbClr val="000000"/>
+                        </a:solidFill>
+                        <a:effectLst/>
+                        <a:latin typeface="Calibri"/>
+                      </a:endParaRPr>
+                    </a:p>
+                  </a:txBody>
+                  <a:tcPr marL="7803" marR="7803" marT="7803" marB="0" anchor="b"/>
+                </a:tc>
+                <a:tc>
+                  <a:txBody>
+                    <a:bodyPr/>
+                    <a:lstStyle/>
+                    <a:p>
+                      <a:pPr algn="ctr" fontAlgn="b"/>
+                      <a:r>
                         <a:rPr lang="es-AR" sz="1200" u="none" strike="noStrike" dirty="0">
                           <a:effectLst/>
                         </a:rPr>
-                        <a:t>Expedición</a:t>
+                        <a:t>1</a:t>
                       </a:r>
                       <a:endParaRPr lang="es-AR" sz="1200" b="0" i="0" u="none" strike="noStrike" dirty="0">
                         <a:solidFill>
@@ -4068,8 +4335,10 @@
                       </a:endParaRPr>
                     </a:p>
                   </a:txBody>
-                  <a:tcPr marL="9525" marR="9525" marT="9525" marB="0" anchor="b"/>
-                </a:tc>
+                  <a:tcPr marL="7803" marR="7803" marT="7803" marB="0" anchor="b"/>
+                </a:tc>
+              </a:tr>
+              <a:tr h="156068">
                 <a:tc>
                   <a:txBody>
                     <a:bodyPr/>
@@ -4077,11 +4346,861 @@
                     <a:p>
                       <a:pPr algn="ctr" fontAlgn="b"/>
                       <a:r>
+                        <a:rPr lang="es-AR" sz="1200" b="1" u="none" strike="noStrike">
+                          <a:effectLst/>
+                        </a:rPr>
+                        <a:t>Primer Subsuelo</a:t>
+                      </a:r>
+                      <a:endParaRPr lang="es-AR" sz="1200" b="1" i="0" u="none" strike="noStrike">
+                        <a:solidFill>
+                          <a:srgbClr val="000000"/>
+                        </a:solidFill>
+                        <a:effectLst/>
+                        <a:latin typeface="Calibri"/>
+                      </a:endParaRPr>
+                    </a:p>
+                  </a:txBody>
+                  <a:tcPr marL="7803" marR="7803" marT="7803" marB="0" anchor="b"/>
+                </a:tc>
+                <a:tc>
+                  <a:txBody>
+                    <a:bodyPr/>
+                    <a:lstStyle/>
+                    <a:p>
+                      <a:pPr algn="l" fontAlgn="b"/>
+                      <a:r>
+                        <a:rPr lang="es-AR" sz="1200" u="none" strike="noStrike">
+                          <a:effectLst/>
+                        </a:rPr>
+                        <a:t>Estacionamiento</a:t>
+                      </a:r>
+                      <a:endParaRPr lang="es-AR" sz="1200" b="0" i="0" u="none" strike="noStrike">
+                        <a:solidFill>
+                          <a:srgbClr val="000000"/>
+                        </a:solidFill>
+                        <a:effectLst/>
+                        <a:latin typeface="Calibri"/>
+                      </a:endParaRPr>
+                    </a:p>
+                  </a:txBody>
+                  <a:tcPr marL="7803" marR="7803" marT="7803" marB="0" anchor="b"/>
+                </a:tc>
+                <a:tc>
+                  <a:txBody>
+                    <a:bodyPr/>
+                    <a:lstStyle/>
+                    <a:p>
+                      <a:pPr algn="l" fontAlgn="b"/>
+                      <a:r>
+                        <a:rPr lang="es-AR" sz="1200" u="none" strike="noStrike">
+                          <a:effectLst/>
+                        </a:rPr>
+                        <a:t>Clase ABC</a:t>
+                      </a:r>
+                      <a:endParaRPr lang="es-AR" sz="1200" b="0" i="0" u="none" strike="noStrike">
+                        <a:solidFill>
+                          <a:srgbClr val="000000"/>
+                        </a:solidFill>
+                        <a:effectLst/>
+                        <a:latin typeface="Calibri"/>
+                      </a:endParaRPr>
+                    </a:p>
+                  </a:txBody>
+                  <a:tcPr marL="7803" marR="7803" marT="7803" marB="0" anchor="b"/>
+                </a:tc>
+                <a:tc>
+                  <a:txBody>
+                    <a:bodyPr/>
+                    <a:lstStyle/>
+                    <a:p>
+                      <a:pPr algn="ctr" fontAlgn="b"/>
+                      <a:r>
+                        <a:rPr lang="es-AR" sz="1200" u="none" strike="noStrike">
+                          <a:effectLst/>
+                        </a:rPr>
+                        <a:t>2</a:t>
+                      </a:r>
+                      <a:endParaRPr lang="es-AR" sz="1200" b="0" i="0" u="none" strike="noStrike">
+                        <a:solidFill>
+                          <a:srgbClr val="000000"/>
+                        </a:solidFill>
+                        <a:effectLst/>
+                        <a:latin typeface="Calibri"/>
+                      </a:endParaRPr>
+                    </a:p>
+                  </a:txBody>
+                  <a:tcPr marL="7803" marR="7803" marT="7803" marB="0" anchor="b"/>
+                </a:tc>
+              </a:tr>
+              <a:tr h="156068">
+                <a:tc>
+                  <a:txBody>
+                    <a:bodyPr/>
+                    <a:lstStyle/>
+                    <a:p>
+                      <a:pPr algn="ctr" fontAlgn="b"/>
+                      <a:r>
+                        <a:rPr lang="es-AR" sz="1200" b="1" u="none" strike="noStrike">
+                          <a:effectLst/>
+                        </a:rPr>
+                        <a:t>Segundo Subsuelo</a:t>
+                      </a:r>
+                      <a:endParaRPr lang="es-AR" sz="1200" b="1" i="0" u="none" strike="noStrike">
+                        <a:solidFill>
+                          <a:srgbClr val="000000"/>
+                        </a:solidFill>
+                        <a:effectLst/>
+                        <a:latin typeface="Calibri"/>
+                      </a:endParaRPr>
+                    </a:p>
+                  </a:txBody>
+                  <a:tcPr marL="7803" marR="7803" marT="7803" marB="0" anchor="b"/>
+                </a:tc>
+                <a:tc>
+                  <a:txBody>
+                    <a:bodyPr/>
+                    <a:lstStyle/>
+                    <a:p>
+                      <a:pPr algn="l" fontAlgn="b"/>
+                      <a:r>
+                        <a:rPr lang="es-AR" sz="1200" u="none" strike="noStrike">
+                          <a:effectLst/>
+                        </a:rPr>
+                        <a:t>Estacionamiento</a:t>
+                      </a:r>
+                      <a:endParaRPr lang="es-AR" sz="1200" b="0" i="0" u="none" strike="noStrike">
+                        <a:solidFill>
+                          <a:srgbClr val="000000"/>
+                        </a:solidFill>
+                        <a:effectLst/>
+                        <a:latin typeface="Calibri"/>
+                      </a:endParaRPr>
+                    </a:p>
+                  </a:txBody>
+                  <a:tcPr marL="7803" marR="7803" marT="7803" marB="0" anchor="b"/>
+                </a:tc>
+                <a:tc>
+                  <a:txBody>
+                    <a:bodyPr/>
+                    <a:lstStyle/>
+                    <a:p>
+                      <a:pPr algn="l" fontAlgn="b"/>
+                      <a:r>
+                        <a:rPr lang="es-AR" sz="1200" u="none" strike="noStrike">
+                          <a:effectLst/>
+                        </a:rPr>
+                        <a:t>Clase ABC</a:t>
+                      </a:r>
+                      <a:endParaRPr lang="es-AR" sz="1200" b="0" i="0" u="none" strike="noStrike">
+                        <a:solidFill>
+                          <a:srgbClr val="000000"/>
+                        </a:solidFill>
+                        <a:effectLst/>
+                        <a:latin typeface="Calibri"/>
+                      </a:endParaRPr>
+                    </a:p>
+                  </a:txBody>
+                  <a:tcPr marL="7803" marR="7803" marT="7803" marB="0" anchor="b"/>
+                </a:tc>
+                <a:tc>
+                  <a:txBody>
+                    <a:bodyPr/>
+                    <a:lstStyle/>
+                    <a:p>
+                      <a:pPr algn="ctr" fontAlgn="b"/>
+                      <a:r>
                         <a:rPr lang="es-AR" sz="1200" u="none" strike="noStrike" dirty="0">
                           <a:effectLst/>
                         </a:rPr>
+                        <a:t>2</a:t>
+                      </a:r>
+                      <a:endParaRPr lang="es-AR" sz="1200" b="0" i="0" u="none" strike="noStrike" dirty="0">
+                        <a:solidFill>
+                          <a:srgbClr val="000000"/>
+                        </a:solidFill>
+                        <a:effectLst/>
+                        <a:latin typeface="Calibri"/>
+                      </a:endParaRPr>
+                    </a:p>
+                  </a:txBody>
+                  <a:tcPr marL="7803" marR="7803" marT="7803" marB="0" anchor="b"/>
+                </a:tc>
+              </a:tr>
+              <a:tr h="156068">
+                <a:tc rowSpan="3">
+                  <a:txBody>
+                    <a:bodyPr/>
+                    <a:lstStyle/>
+                    <a:p>
+                      <a:pPr algn="ctr" fontAlgn="ctr"/>
+                      <a:r>
+                        <a:rPr lang="es-AR" sz="1200" b="1" u="none" strike="noStrike">
+                          <a:effectLst/>
+                        </a:rPr>
+                        <a:t>Planta Baja </a:t>
+                      </a:r>
+                      <a:endParaRPr lang="es-AR" sz="1200" b="1" i="0" u="none" strike="noStrike">
+                        <a:solidFill>
+                          <a:srgbClr val="000000"/>
+                        </a:solidFill>
+                        <a:effectLst/>
+                        <a:latin typeface="Calibri"/>
+                      </a:endParaRPr>
+                    </a:p>
+                  </a:txBody>
+                  <a:tcPr marL="7803" marR="7803" marT="7803" marB="0" anchor="ctr"/>
+                </a:tc>
+                <a:tc>
+                  <a:txBody>
+                    <a:bodyPr/>
+                    <a:lstStyle/>
+                    <a:p>
+                      <a:pPr algn="l" fontAlgn="b"/>
+                      <a:r>
+                        <a:rPr lang="es-AR" sz="1200" u="none" strike="noStrike">
+                          <a:effectLst/>
+                        </a:rPr>
+                        <a:t>Buffet</a:t>
+                      </a:r>
+                      <a:endParaRPr lang="es-AR" sz="1200" b="0" i="0" u="none" strike="noStrike">
+                        <a:solidFill>
+                          <a:srgbClr val="000000"/>
+                        </a:solidFill>
+                        <a:effectLst/>
+                        <a:latin typeface="Calibri"/>
+                      </a:endParaRPr>
+                    </a:p>
+                  </a:txBody>
+                  <a:tcPr marL="7803" marR="7803" marT="7803" marB="0" anchor="b"/>
+                </a:tc>
+                <a:tc>
+                  <a:txBody>
+                    <a:bodyPr/>
+                    <a:lstStyle/>
+                    <a:p>
+                      <a:pPr algn="l" fontAlgn="b"/>
+                      <a:r>
+                        <a:rPr lang="es-AR" sz="1200" u="none" strike="noStrike">
+                          <a:effectLst/>
+                        </a:rPr>
+                        <a:t>Clase K, Clase AC</a:t>
+                      </a:r>
+                      <a:endParaRPr lang="es-AR" sz="1200" b="0" i="0" u="none" strike="noStrike">
+                        <a:solidFill>
+                          <a:srgbClr val="000000"/>
+                        </a:solidFill>
+                        <a:effectLst/>
+                        <a:latin typeface="Calibri"/>
+                      </a:endParaRPr>
+                    </a:p>
+                  </a:txBody>
+                  <a:tcPr marL="7803" marR="7803" marT="7803" marB="0" anchor="b"/>
+                </a:tc>
+                <a:tc>
+                  <a:txBody>
+                    <a:bodyPr/>
+                    <a:lstStyle/>
+                    <a:p>
+                      <a:pPr algn="ctr" fontAlgn="b"/>
+                      <a:r>
+                        <a:rPr lang="es-AR" sz="1200" u="none" strike="noStrike">
+                          <a:effectLst/>
+                        </a:rPr>
+                        <a:t>2</a:t>
+                      </a:r>
+                      <a:endParaRPr lang="es-AR" sz="1200" b="0" i="0" u="none" strike="noStrike">
+                        <a:solidFill>
+                          <a:srgbClr val="000000"/>
+                        </a:solidFill>
+                        <a:effectLst/>
+                        <a:latin typeface="Calibri"/>
+                      </a:endParaRPr>
+                    </a:p>
+                  </a:txBody>
+                  <a:tcPr marL="7803" marR="7803" marT="7803" marB="0" anchor="b"/>
+                </a:tc>
+              </a:tr>
+              <a:tr h="156068">
+                <a:tc vMerge="1">
+                  <a:txBody>
+                    <a:bodyPr/>
+                    <a:lstStyle/>
+                    <a:p>
+                      <a:endParaRPr lang="es-AR"/>
+                    </a:p>
+                  </a:txBody>
+                  <a:tcPr/>
+                </a:tc>
+                <a:tc>
+                  <a:txBody>
+                    <a:bodyPr/>
+                    <a:lstStyle/>
+                    <a:p>
+                      <a:pPr algn="l" fontAlgn="b"/>
+                      <a:r>
+                        <a:rPr lang="es-AR" sz="1200" u="none" strike="noStrike">
+                          <a:effectLst/>
+                        </a:rPr>
+                        <a:t>Servidores</a:t>
+                      </a:r>
+                      <a:endParaRPr lang="es-AR" sz="1200" b="0" i="0" u="none" strike="noStrike">
+                        <a:solidFill>
+                          <a:srgbClr val="000000"/>
+                        </a:solidFill>
+                        <a:effectLst/>
+                        <a:latin typeface="Calibri"/>
+                      </a:endParaRPr>
+                    </a:p>
+                  </a:txBody>
+                  <a:tcPr marL="7803" marR="7803" marT="7803" marB="0" anchor="b"/>
+                </a:tc>
+                <a:tc>
+                  <a:txBody>
+                    <a:bodyPr/>
+                    <a:lstStyle/>
+                    <a:p>
+                      <a:pPr algn="l" fontAlgn="b"/>
+                      <a:r>
+                        <a:rPr lang="es-AR" sz="1200" u="none" strike="noStrike">
+                          <a:effectLst/>
+                        </a:rPr>
+                        <a:t>Clase AC</a:t>
+                      </a:r>
+                      <a:endParaRPr lang="es-AR" sz="1200" b="0" i="0" u="none" strike="noStrike">
+                        <a:solidFill>
+                          <a:srgbClr val="000000"/>
+                        </a:solidFill>
+                        <a:effectLst/>
+                        <a:latin typeface="Calibri"/>
+                      </a:endParaRPr>
+                    </a:p>
+                  </a:txBody>
+                  <a:tcPr marL="7803" marR="7803" marT="7803" marB="0" anchor="b"/>
+                </a:tc>
+                <a:tc>
+                  <a:txBody>
+                    <a:bodyPr/>
+                    <a:lstStyle/>
+                    <a:p>
+                      <a:pPr algn="ctr" fontAlgn="b"/>
+                      <a:r>
+                        <a:rPr lang="es-AR" sz="1200" u="none" strike="noStrike">
+                          <a:effectLst/>
+                        </a:rPr>
+                        <a:t>1</a:t>
+                      </a:r>
+                      <a:endParaRPr lang="es-AR" sz="1200" b="0" i="0" u="none" strike="noStrike">
+                        <a:solidFill>
+                          <a:srgbClr val="000000"/>
+                        </a:solidFill>
+                        <a:effectLst/>
+                        <a:latin typeface="Calibri"/>
+                      </a:endParaRPr>
+                    </a:p>
+                  </a:txBody>
+                  <a:tcPr marL="7803" marR="7803" marT="7803" marB="0" anchor="b"/>
+                </a:tc>
+              </a:tr>
+              <a:tr h="156068">
+                <a:tc vMerge="1">
+                  <a:txBody>
+                    <a:bodyPr/>
+                    <a:lstStyle/>
+                    <a:p>
+                      <a:endParaRPr lang="es-AR"/>
+                    </a:p>
+                  </a:txBody>
+                  <a:tcPr/>
+                </a:tc>
+                <a:tc>
+                  <a:txBody>
+                    <a:bodyPr/>
+                    <a:lstStyle/>
+                    <a:p>
+                      <a:pPr algn="l" fontAlgn="b"/>
+                      <a:r>
+                        <a:rPr lang="es-AR" sz="1200" u="none" strike="noStrike">
+                          <a:effectLst/>
+                        </a:rPr>
+                        <a:t>Mantenimiento</a:t>
+                      </a:r>
+                      <a:endParaRPr lang="es-AR" sz="1200" b="0" i="0" u="none" strike="noStrike">
+                        <a:solidFill>
+                          <a:srgbClr val="000000"/>
+                        </a:solidFill>
+                        <a:effectLst/>
+                        <a:latin typeface="Calibri"/>
+                      </a:endParaRPr>
+                    </a:p>
+                  </a:txBody>
+                  <a:tcPr marL="7803" marR="7803" marT="7803" marB="0" anchor="b"/>
+                </a:tc>
+                <a:tc>
+                  <a:txBody>
+                    <a:bodyPr/>
+                    <a:lstStyle/>
+                    <a:p>
+                      <a:pPr algn="l" fontAlgn="b"/>
+                      <a:r>
+                        <a:rPr lang="es-AR" sz="1200" u="none" strike="noStrike">
+                          <a:effectLst/>
+                        </a:rPr>
                         <a:t>Clase ABC</a:t>
                       </a:r>
+                      <a:endParaRPr lang="es-AR" sz="1200" b="0" i="0" u="none" strike="noStrike">
+                        <a:solidFill>
+                          <a:srgbClr val="000000"/>
+                        </a:solidFill>
+                        <a:effectLst/>
+                        <a:latin typeface="Calibri"/>
+                      </a:endParaRPr>
+                    </a:p>
+                  </a:txBody>
+                  <a:tcPr marL="7803" marR="7803" marT="7803" marB="0" anchor="b"/>
+                </a:tc>
+                <a:tc>
+                  <a:txBody>
+                    <a:bodyPr/>
+                    <a:lstStyle/>
+                    <a:p>
+                      <a:pPr algn="ctr" fontAlgn="b"/>
+                      <a:r>
+                        <a:rPr lang="es-AR" sz="1200" u="none" strike="noStrike">
+                          <a:effectLst/>
+                        </a:rPr>
+                        <a:t>1</a:t>
+                      </a:r>
+                      <a:endParaRPr lang="es-AR" sz="1200" b="0" i="0" u="none" strike="noStrike">
+                        <a:solidFill>
+                          <a:srgbClr val="000000"/>
+                        </a:solidFill>
+                        <a:effectLst/>
+                        <a:latin typeface="Calibri"/>
+                      </a:endParaRPr>
+                    </a:p>
+                  </a:txBody>
+                  <a:tcPr marL="7803" marR="7803" marT="7803" marB="0" anchor="b"/>
+                </a:tc>
+              </a:tr>
+              <a:tr h="156068">
+                <a:tc rowSpan="4">
+                  <a:txBody>
+                    <a:bodyPr/>
+                    <a:lstStyle/>
+                    <a:p>
+                      <a:pPr algn="ctr" fontAlgn="ctr"/>
+                      <a:r>
+                        <a:rPr lang="es-AR" sz="1200" b="1" u="none" strike="noStrike">
+                          <a:effectLst/>
+                        </a:rPr>
+                        <a:t>Primer Piso</a:t>
+                      </a:r>
+                      <a:endParaRPr lang="es-AR" sz="1200" b="1" i="0" u="none" strike="noStrike">
+                        <a:solidFill>
+                          <a:srgbClr val="000000"/>
+                        </a:solidFill>
+                        <a:effectLst/>
+                        <a:latin typeface="Calibri"/>
+                      </a:endParaRPr>
+                    </a:p>
+                  </a:txBody>
+                  <a:tcPr marL="7803" marR="7803" marT="7803" marB="0" anchor="ctr"/>
+                </a:tc>
+                <a:tc>
+                  <a:txBody>
+                    <a:bodyPr/>
+                    <a:lstStyle/>
+                    <a:p>
+                      <a:pPr algn="l" fontAlgn="b"/>
+                      <a:r>
+                        <a:rPr lang="es-AR" sz="1200" u="none" strike="noStrike">
+                          <a:effectLst/>
+                        </a:rPr>
+                        <a:t>Producto</a:t>
+                      </a:r>
+                      <a:endParaRPr lang="es-AR" sz="1200" b="0" i="0" u="none" strike="noStrike">
+                        <a:solidFill>
+                          <a:srgbClr val="000000"/>
+                        </a:solidFill>
+                        <a:effectLst/>
+                        <a:latin typeface="Calibri"/>
+                      </a:endParaRPr>
+                    </a:p>
+                  </a:txBody>
+                  <a:tcPr marL="7803" marR="7803" marT="7803" marB="0" anchor="b"/>
+                </a:tc>
+                <a:tc>
+                  <a:txBody>
+                    <a:bodyPr/>
+                    <a:lstStyle/>
+                    <a:p>
+                      <a:pPr algn="l" fontAlgn="b"/>
+                      <a:r>
+                        <a:rPr lang="es-AR" sz="1200" u="none" strike="noStrike">
+                          <a:effectLst/>
+                        </a:rPr>
+                        <a:t>Clase AC</a:t>
+                      </a:r>
+                      <a:endParaRPr lang="es-AR" sz="1200" b="0" i="0" u="none" strike="noStrike">
+                        <a:solidFill>
+                          <a:srgbClr val="000000"/>
+                        </a:solidFill>
+                        <a:effectLst/>
+                        <a:latin typeface="Calibri"/>
+                      </a:endParaRPr>
+                    </a:p>
+                  </a:txBody>
+                  <a:tcPr marL="7803" marR="7803" marT="7803" marB="0" anchor="b"/>
+                </a:tc>
+                <a:tc>
+                  <a:txBody>
+                    <a:bodyPr/>
+                    <a:lstStyle/>
+                    <a:p>
+                      <a:pPr algn="ctr" fontAlgn="b"/>
+                      <a:r>
+                        <a:rPr lang="es-AR" sz="1200" u="none" strike="noStrike">
+                          <a:effectLst/>
+                        </a:rPr>
+                        <a:t>1</a:t>
+                      </a:r>
+                      <a:endParaRPr lang="es-AR" sz="1200" b="0" i="0" u="none" strike="noStrike">
+                        <a:solidFill>
+                          <a:srgbClr val="000000"/>
+                        </a:solidFill>
+                        <a:effectLst/>
+                        <a:latin typeface="Calibri"/>
+                      </a:endParaRPr>
+                    </a:p>
+                  </a:txBody>
+                  <a:tcPr marL="7803" marR="7803" marT="7803" marB="0" anchor="b"/>
+                </a:tc>
+              </a:tr>
+              <a:tr h="156068">
+                <a:tc vMerge="1">
+                  <a:txBody>
+                    <a:bodyPr/>
+                    <a:lstStyle/>
+                    <a:p>
+                      <a:endParaRPr lang="es-AR"/>
+                    </a:p>
+                  </a:txBody>
+                  <a:tcPr/>
+                </a:tc>
+                <a:tc>
+                  <a:txBody>
+                    <a:bodyPr/>
+                    <a:lstStyle/>
+                    <a:p>
+                      <a:pPr algn="l" fontAlgn="b"/>
+                      <a:r>
+                        <a:rPr lang="es-AR" sz="1200" u="none" strike="noStrike">
+                          <a:effectLst/>
+                        </a:rPr>
+                        <a:t>Redacción</a:t>
+                      </a:r>
+                      <a:endParaRPr lang="es-AR" sz="1200" b="0" i="0" u="none" strike="noStrike">
+                        <a:solidFill>
+                          <a:srgbClr val="000000"/>
+                        </a:solidFill>
+                        <a:effectLst/>
+                        <a:latin typeface="Calibri"/>
+                      </a:endParaRPr>
+                    </a:p>
+                  </a:txBody>
+                  <a:tcPr marL="7803" marR="7803" marT="7803" marB="0" anchor="b"/>
+                </a:tc>
+                <a:tc>
+                  <a:txBody>
+                    <a:bodyPr/>
+                    <a:lstStyle/>
+                    <a:p>
+                      <a:pPr algn="l" fontAlgn="b"/>
+                      <a:r>
+                        <a:rPr lang="es-AR" sz="1200" u="none" strike="noStrike">
+                          <a:effectLst/>
+                        </a:rPr>
+                        <a:t>Clase AC</a:t>
+                      </a:r>
+                      <a:endParaRPr lang="es-AR" sz="1200" b="0" i="0" u="none" strike="noStrike">
+                        <a:solidFill>
+                          <a:srgbClr val="000000"/>
+                        </a:solidFill>
+                        <a:effectLst/>
+                        <a:latin typeface="Calibri"/>
+                      </a:endParaRPr>
+                    </a:p>
+                  </a:txBody>
+                  <a:tcPr marL="7803" marR="7803" marT="7803" marB="0" anchor="b"/>
+                </a:tc>
+                <a:tc>
+                  <a:txBody>
+                    <a:bodyPr/>
+                    <a:lstStyle/>
+                    <a:p>
+                      <a:pPr algn="ctr" fontAlgn="b"/>
+                      <a:r>
+                        <a:rPr lang="es-AR" sz="1200" u="none" strike="noStrike">
+                          <a:effectLst/>
+                        </a:rPr>
+                        <a:t>1</a:t>
+                      </a:r>
+                      <a:endParaRPr lang="es-AR" sz="1200" b="0" i="0" u="none" strike="noStrike">
+                        <a:solidFill>
+                          <a:srgbClr val="000000"/>
+                        </a:solidFill>
+                        <a:effectLst/>
+                        <a:latin typeface="Calibri"/>
+                      </a:endParaRPr>
+                    </a:p>
+                  </a:txBody>
+                  <a:tcPr marL="7803" marR="7803" marT="7803" marB="0" anchor="b"/>
+                </a:tc>
+              </a:tr>
+              <a:tr h="156068">
+                <a:tc vMerge="1">
+                  <a:txBody>
+                    <a:bodyPr/>
+                    <a:lstStyle/>
+                    <a:p>
+                      <a:endParaRPr lang="es-AR"/>
+                    </a:p>
+                  </a:txBody>
+                  <a:tcPr/>
+                </a:tc>
+                <a:tc>
+                  <a:txBody>
+                    <a:bodyPr/>
+                    <a:lstStyle/>
+                    <a:p>
+                      <a:pPr algn="l" fontAlgn="b"/>
+                      <a:r>
+                        <a:rPr lang="es-AR" sz="1200" u="none" strike="noStrike">
+                          <a:effectLst/>
+                        </a:rPr>
+                        <a:t>kitchenette</a:t>
+                      </a:r>
+                      <a:endParaRPr lang="es-AR" sz="1200" b="0" i="0" u="none" strike="noStrike">
+                        <a:solidFill>
+                          <a:srgbClr val="000000"/>
+                        </a:solidFill>
+                        <a:effectLst/>
+                        <a:latin typeface="Calibri"/>
+                      </a:endParaRPr>
+                    </a:p>
+                  </a:txBody>
+                  <a:tcPr marL="7803" marR="7803" marT="7803" marB="0" anchor="b"/>
+                </a:tc>
+                <a:tc>
+                  <a:txBody>
+                    <a:bodyPr/>
+                    <a:lstStyle/>
+                    <a:p>
+                      <a:pPr algn="l" fontAlgn="b"/>
+                      <a:r>
+                        <a:rPr lang="es-AR" sz="1200" u="none" strike="noStrike">
+                          <a:effectLst/>
+                        </a:rPr>
+                        <a:t>Clase K</a:t>
+                      </a:r>
+                      <a:endParaRPr lang="es-AR" sz="1200" b="0" i="0" u="none" strike="noStrike">
+                        <a:solidFill>
+                          <a:srgbClr val="000000"/>
+                        </a:solidFill>
+                        <a:effectLst/>
+                        <a:latin typeface="Calibri"/>
+                      </a:endParaRPr>
+                    </a:p>
+                  </a:txBody>
+                  <a:tcPr marL="7803" marR="7803" marT="7803" marB="0" anchor="b"/>
+                </a:tc>
+                <a:tc>
+                  <a:txBody>
+                    <a:bodyPr/>
+                    <a:lstStyle/>
+                    <a:p>
+                      <a:pPr algn="ctr" fontAlgn="b"/>
+                      <a:r>
+                        <a:rPr lang="es-AR" sz="1200" u="none" strike="noStrike">
+                          <a:effectLst/>
+                        </a:rPr>
+                        <a:t>1</a:t>
+                      </a:r>
+                      <a:endParaRPr lang="es-AR" sz="1200" b="0" i="0" u="none" strike="noStrike">
+                        <a:solidFill>
+                          <a:srgbClr val="000000"/>
+                        </a:solidFill>
+                        <a:effectLst/>
+                        <a:latin typeface="Calibri"/>
+                      </a:endParaRPr>
+                    </a:p>
+                  </a:txBody>
+                  <a:tcPr marL="7803" marR="7803" marT="7803" marB="0" anchor="b"/>
+                </a:tc>
+              </a:tr>
+              <a:tr h="156068">
+                <a:tc vMerge="1">
+                  <a:txBody>
+                    <a:bodyPr/>
+                    <a:lstStyle/>
+                    <a:p>
+                      <a:endParaRPr lang="es-AR"/>
+                    </a:p>
+                  </a:txBody>
+                  <a:tcPr/>
+                </a:tc>
+                <a:tc>
+                  <a:txBody>
+                    <a:bodyPr/>
+                    <a:lstStyle/>
+                    <a:p>
+                      <a:pPr algn="l" fontAlgn="b"/>
+                      <a:r>
+                        <a:rPr lang="es-AR" sz="1200" u="none" strike="noStrike">
+                          <a:effectLst/>
+                        </a:rPr>
+                        <a:t>Escaleras</a:t>
+                      </a:r>
+                      <a:endParaRPr lang="es-AR" sz="1200" b="0" i="0" u="none" strike="noStrike">
+                        <a:solidFill>
+                          <a:srgbClr val="000000"/>
+                        </a:solidFill>
+                        <a:effectLst/>
+                        <a:latin typeface="Calibri"/>
+                      </a:endParaRPr>
+                    </a:p>
+                  </a:txBody>
+                  <a:tcPr marL="7803" marR="7803" marT="7803" marB="0" anchor="b"/>
+                </a:tc>
+                <a:tc>
+                  <a:txBody>
+                    <a:bodyPr/>
+                    <a:lstStyle/>
+                    <a:p>
+                      <a:pPr algn="l" fontAlgn="b"/>
+                      <a:r>
+                        <a:rPr lang="es-AR" sz="1200" u="none" strike="noStrike">
+                          <a:effectLst/>
+                        </a:rPr>
+                        <a:t>Clase AC</a:t>
+                      </a:r>
+                      <a:endParaRPr lang="es-AR" sz="1200" b="0" i="0" u="none" strike="noStrike">
+                        <a:solidFill>
+                          <a:srgbClr val="000000"/>
+                        </a:solidFill>
+                        <a:effectLst/>
+                        <a:latin typeface="Calibri"/>
+                      </a:endParaRPr>
+                    </a:p>
+                  </a:txBody>
+                  <a:tcPr marL="7803" marR="7803" marT="7803" marB="0" anchor="b"/>
+                </a:tc>
+                <a:tc>
+                  <a:txBody>
+                    <a:bodyPr/>
+                    <a:lstStyle/>
+                    <a:p>
+                      <a:pPr algn="ctr" fontAlgn="b"/>
+                      <a:r>
+                        <a:rPr lang="es-AR" sz="1200" u="none" strike="noStrike">
+                          <a:effectLst/>
+                        </a:rPr>
+                        <a:t>1</a:t>
+                      </a:r>
+                      <a:endParaRPr lang="es-AR" sz="1200" b="0" i="0" u="none" strike="noStrike">
+                        <a:solidFill>
+                          <a:srgbClr val="000000"/>
+                        </a:solidFill>
+                        <a:effectLst/>
+                        <a:latin typeface="Calibri"/>
+                      </a:endParaRPr>
+                    </a:p>
+                  </a:txBody>
+                  <a:tcPr marL="7803" marR="7803" marT="7803" marB="0" anchor="b"/>
+                </a:tc>
+              </a:tr>
+              <a:tr h="156068">
+                <a:tc rowSpan="4">
+                  <a:txBody>
+                    <a:bodyPr/>
+                    <a:lstStyle/>
+                    <a:p>
+                      <a:pPr algn="ctr" fontAlgn="ctr"/>
+                      <a:r>
+                        <a:rPr lang="es-AR" sz="1200" b="1" u="none" strike="noStrike">
+                          <a:effectLst/>
+                        </a:rPr>
+                        <a:t>Segundo Piso</a:t>
+                      </a:r>
+                      <a:endParaRPr lang="es-AR" sz="1200" b="1" i="0" u="none" strike="noStrike">
+                        <a:solidFill>
+                          <a:srgbClr val="000000"/>
+                        </a:solidFill>
+                        <a:effectLst/>
+                        <a:latin typeface="Calibri"/>
+                      </a:endParaRPr>
+                    </a:p>
+                  </a:txBody>
+                  <a:tcPr marL="7803" marR="7803" marT="7803" marB="0" anchor="ctr"/>
+                </a:tc>
+                <a:tc>
+                  <a:txBody>
+                    <a:bodyPr/>
+                    <a:lstStyle/>
+                    <a:p>
+                      <a:pPr algn="l" fontAlgn="b"/>
+                      <a:r>
+                        <a:rPr lang="es-AR" sz="1200" u="none" strike="noStrike">
+                          <a:effectLst/>
+                        </a:rPr>
+                        <a:t>Área Digital</a:t>
+                      </a:r>
+                      <a:endParaRPr lang="es-AR" sz="1200" b="0" i="0" u="none" strike="noStrike">
+                        <a:solidFill>
+                          <a:srgbClr val="000000"/>
+                        </a:solidFill>
+                        <a:effectLst/>
+                        <a:latin typeface="Calibri"/>
+                      </a:endParaRPr>
+                    </a:p>
+                  </a:txBody>
+                  <a:tcPr marL="7803" marR="7803" marT="7803" marB="0" anchor="b"/>
+                </a:tc>
+                <a:tc>
+                  <a:txBody>
+                    <a:bodyPr/>
+                    <a:lstStyle/>
+                    <a:p>
+                      <a:pPr algn="l" fontAlgn="b"/>
+                      <a:r>
+                        <a:rPr lang="es-AR" sz="1200" u="none" strike="noStrike">
+                          <a:effectLst/>
+                        </a:rPr>
+                        <a:t>Clase AC</a:t>
+                      </a:r>
+                      <a:endParaRPr lang="es-AR" sz="1200" b="0" i="0" u="none" strike="noStrike">
+                        <a:solidFill>
+                          <a:srgbClr val="000000"/>
+                        </a:solidFill>
+                        <a:effectLst/>
+                        <a:latin typeface="Calibri"/>
+                      </a:endParaRPr>
+                    </a:p>
+                  </a:txBody>
+                  <a:tcPr marL="7803" marR="7803" marT="7803" marB="0" anchor="b"/>
+                </a:tc>
+                <a:tc>
+                  <a:txBody>
+                    <a:bodyPr/>
+                    <a:lstStyle/>
+                    <a:p>
+                      <a:pPr algn="ctr" fontAlgn="b"/>
+                      <a:r>
+                        <a:rPr lang="es-AR" sz="1200" u="none" strike="noStrike" dirty="0">
+                          <a:effectLst/>
+                        </a:rPr>
+                        <a:t>1</a:t>
+                      </a:r>
                       <a:endParaRPr lang="es-AR" sz="1200" b="0" i="0" u="none" strike="noStrike" dirty="0">
                         <a:solidFill>
                           <a:srgbClr val="000000"/>
@@ -4091,7 +5210,65 @@
                       </a:endParaRPr>
                     </a:p>
                   </a:txBody>
-                  <a:tcPr marL="9525" marR="9525" marT="9525" marB="0" anchor="b"/>
+                  <a:tcPr marL="7803" marR="7803" marT="7803" marB="0" anchor="b"/>
+                </a:tc>
+              </a:tr>
+              <a:tr h="156068">
+                <a:tc vMerge="1">
+                  <a:txBody>
+                    <a:bodyPr/>
+                    <a:lstStyle/>
+                    <a:p>
+                      <a:endParaRPr lang="es-AR"/>
+                    </a:p>
+                  </a:txBody>
+                  <a:tcPr/>
+                </a:tc>
+                <a:tc>
+                  <a:txBody>
+                    <a:bodyPr/>
+                    <a:lstStyle/>
+                    <a:p>
+                      <a:pPr algn="l" fontAlgn="b"/>
+                      <a:r>
+                        <a:rPr lang="es-AR" sz="1200" u="none" strike="noStrike">
+                          <a:effectLst/>
+                        </a:rPr>
+                        <a:t>Pasillo Sala y Oficinas</a:t>
+                      </a:r>
+                      <a:endParaRPr lang="es-AR" sz="1200" b="0" i="0" u="none" strike="noStrike">
+                        <a:solidFill>
+                          <a:srgbClr val="000000"/>
+                        </a:solidFill>
+                        <a:effectLst/>
+                        <a:latin typeface="Calibri"/>
+                      </a:endParaRPr>
+                    </a:p>
+                  </a:txBody>
+                  <a:tcPr marL="7803" marR="7803" marT="7803" marB="0" anchor="b"/>
+                </a:tc>
+                <a:tc>
+                  <a:txBody>
+                    <a:bodyPr/>
+                    <a:lstStyle/>
+                    <a:p>
+                      <a:pPr algn="l" fontAlgn="b"/>
+                      <a:r>
+                        <a:rPr lang="es-AR" sz="1200" u="none" strike="noStrike">
+                          <a:effectLst/>
+                        </a:rPr>
+                        <a:t>Clase AC</a:t>
+                      </a:r>
+                      <a:endParaRPr lang="es-AR" sz="1200" b="0" i="0" u="none" strike="noStrike">
+                        <a:solidFill>
+                          <a:srgbClr val="000000"/>
+                        </a:solidFill>
+                        <a:effectLst/>
+                        <a:latin typeface="Calibri"/>
+                      </a:endParaRPr>
+                    </a:p>
+                  </a:txBody>
+                  <a:tcPr marL="7803" marR="7803" marT="7803" marB="0" anchor="b"/>
                 </a:tc>
                 <a:tc>
                   <a:txBody>
@@ -4100,10 +5277,91 @@
                     <a:p>
                       <a:pPr algn="ctr" fontAlgn="b"/>
                       <a:r>
+                        <a:rPr lang="es-AR" sz="1200" u="none" strike="noStrike">
+                          <a:effectLst/>
+                        </a:rPr>
+                        <a:t>1</a:t>
+                      </a:r>
+                      <a:endParaRPr lang="es-AR" sz="1200" b="0" i="0" u="none" strike="noStrike">
+                        <a:solidFill>
+                          <a:srgbClr val="000000"/>
+                        </a:solidFill>
+                        <a:effectLst/>
+                        <a:latin typeface="Calibri"/>
+                      </a:endParaRPr>
+                    </a:p>
+                  </a:txBody>
+                  <a:tcPr marL="7803" marR="7803" marT="7803" marB="0" anchor="b"/>
+                </a:tc>
+              </a:tr>
+              <a:tr h="156068">
+                <a:tc vMerge="1">
+                  <a:txBody>
+                    <a:bodyPr/>
+                    <a:lstStyle/>
+                    <a:p>
+                      <a:endParaRPr lang="es-AR"/>
+                    </a:p>
+                  </a:txBody>
+                  <a:tcPr/>
+                </a:tc>
+                <a:tc>
+                  <a:txBody>
+                    <a:bodyPr/>
+                    <a:lstStyle/>
+                    <a:p>
+                      <a:pPr algn="l" fontAlgn="b"/>
+                      <a:r>
+                        <a:rPr lang="es-AR" sz="1200" u="none" strike="noStrike">
+                          <a:effectLst/>
+                        </a:rPr>
+                        <a:t>kitchenette</a:t>
+                      </a:r>
+                      <a:endParaRPr lang="es-AR" sz="1200" b="0" i="0" u="none" strike="noStrike">
+                        <a:solidFill>
+                          <a:srgbClr val="000000"/>
+                        </a:solidFill>
+                        <a:effectLst/>
+                        <a:latin typeface="Calibri"/>
+                      </a:endParaRPr>
+                    </a:p>
+                  </a:txBody>
+                  <a:tcPr marL="7803" marR="7803" marT="7803" marB="0" anchor="b"/>
+                </a:tc>
+                <a:tc>
+                  <a:txBody>
+                    <a:bodyPr/>
+                    <a:lstStyle/>
+                    <a:p>
+                      <a:pPr algn="l" fontAlgn="b"/>
+                      <a:r>
+                        <a:rPr lang="es-AR" sz="1200" u="none" strike="noStrike">
+                          <a:effectLst/>
+                        </a:rPr>
+                        <a:t>Clase K</a:t>
+                      </a:r>
+                      <a:endParaRPr lang="es-AR" sz="1200" b="0" i="0" u="none" strike="noStrike">
+                        <a:solidFill>
+                          <a:srgbClr val="000000"/>
+                        </a:solidFill>
+                        <a:effectLst/>
+                        <a:latin typeface="Calibri"/>
+                      </a:endParaRPr>
+                    </a:p>
+                  </a:txBody>
+                  <a:tcPr marL="7803" marR="7803" marT="7803" marB="0" anchor="b"/>
+                </a:tc>
+                <a:tc>
+                  <a:txBody>
+                    <a:bodyPr/>
+                    <a:lstStyle/>
+                    <a:p>
+                      <a:pPr algn="ctr" fontAlgn="b"/>
+                      <a:r>
                         <a:rPr lang="es-AR" sz="1200" u="none" strike="noStrike" dirty="0">
                           <a:effectLst/>
                         </a:rPr>
-                        <a:t>5</a:t>
+                        <a:t>1</a:t>
                       </a:r>
                       <a:endParaRPr lang="es-AR" sz="1200" b="0" i="0" u="none" strike="noStrike" dirty="0">
                         <a:solidFill>
@@ -4114,10 +5372,66 @@
                       </a:endParaRPr>
                     </a:p>
                   </a:txBody>
-                  <a:tcPr marL="9525" marR="9525" marT="9525" marB="0" anchor="b"/>
+                  <a:tcPr marL="7803" marR="7803" marT="7803" marB="0" anchor="b"/>
                 </a:tc>
               </a:tr>
-              <a:tr h="274311">
+              <a:tr h="156068">
+                <a:tc vMerge="1">
+                  <a:txBody>
+                    <a:bodyPr/>
+                    <a:lstStyle/>
+                    <a:p>
+                      <a:endParaRPr lang="es-AR"/>
+                    </a:p>
+                  </a:txBody>
+                  <a:tcPr/>
+                </a:tc>
+                <a:tc>
+                  <a:txBody>
+                    <a:bodyPr/>
+                    <a:lstStyle/>
+                    <a:p>
+                      <a:pPr algn="l" fontAlgn="b"/>
+                      <a:r>
+                        <a:rPr lang="es-AR" sz="1200" u="none" strike="noStrike">
+                          <a:effectLst/>
+                        </a:rPr>
+                        <a:t>Escaleras</a:t>
+                      </a:r>
+                      <a:endParaRPr lang="es-AR" sz="1200" b="0" i="0" u="none" strike="noStrike">
+                        <a:solidFill>
+                          <a:srgbClr val="000000"/>
+                        </a:solidFill>
+                        <a:effectLst/>
+                        <a:latin typeface="Calibri"/>
+                      </a:endParaRPr>
+                    </a:p>
+                  </a:txBody>
+                  <a:tcPr marL="7803" marR="7803" marT="7803" marB="0" anchor="b"/>
+                </a:tc>
+                <a:tc>
+                  <a:txBody>
+                    <a:bodyPr/>
+                    <a:lstStyle/>
+                    <a:p>
+                      <a:pPr algn="l" fontAlgn="b"/>
+                      <a:r>
+                        <a:rPr lang="es-AR" sz="1200" u="none" strike="noStrike">
+                          <a:effectLst/>
+                        </a:rPr>
+                        <a:t>Clase AC</a:t>
+                      </a:r>
+                      <a:endParaRPr lang="es-AR" sz="1200" b="0" i="0" u="none" strike="noStrike">
+                        <a:solidFill>
+                          <a:srgbClr val="000000"/>
+                        </a:solidFill>
+                        <a:effectLst/>
+                        <a:latin typeface="Calibri"/>
+                      </a:endParaRPr>
+                    </a:p>
+                  </a:txBody>
+                  <a:tcPr marL="7803" marR="7803" marT="7803" marB="0" anchor="b"/>
+                </a:tc>
                 <a:tc>
                   <a:txBody>
                     <a:bodyPr/>
@@ -4125,21 +5439,92 @@
                     <a:p>
                       <a:pPr algn="ctr" fontAlgn="b"/>
                       <a:r>
-                        <a:rPr lang="es-AR" sz="1400" b="1" u="none" strike="noStrike" dirty="0">
-                          <a:effectLst/>
-                        </a:rPr>
-                        <a:t>Primer Subsuelo</a:t>
-                      </a:r>
-                      <a:endParaRPr lang="es-AR" sz="1400" b="1" i="0" u="none" strike="noStrike" dirty="0">
-                        <a:solidFill>
-                          <a:srgbClr val="000000"/>
-                        </a:solidFill>
-                        <a:effectLst/>
-                        <a:latin typeface="Calibri"/>
-                      </a:endParaRPr>
-                    </a:p>
-                  </a:txBody>
-                  <a:tcPr marL="9525" marR="9525" marT="9525" marB="0" anchor="b"/>
+                        <a:rPr lang="es-AR" sz="1200" u="none" strike="noStrike">
+                          <a:effectLst/>
+                        </a:rPr>
+                        <a:t>1</a:t>
+                      </a:r>
+                      <a:endParaRPr lang="es-AR" sz="1200" b="0" i="0" u="none" strike="noStrike">
+                        <a:solidFill>
+                          <a:srgbClr val="000000"/>
+                        </a:solidFill>
+                        <a:effectLst/>
+                        <a:latin typeface="Calibri"/>
+                      </a:endParaRPr>
+                    </a:p>
+                  </a:txBody>
+                  <a:tcPr marL="7803" marR="7803" marT="7803" marB="0" anchor="b"/>
+                </a:tc>
+              </a:tr>
+              <a:tr h="156068">
+                <a:tc rowSpan="4">
+                  <a:txBody>
+                    <a:bodyPr/>
+                    <a:lstStyle/>
+                    <a:p>
+                      <a:pPr algn="ctr" fontAlgn="ctr"/>
+                      <a:r>
+                        <a:rPr lang="es-AR" sz="1200" b="1" u="none" strike="noStrike">
+                          <a:effectLst/>
+                        </a:rPr>
+                        <a:t>Tercer Piso</a:t>
+                      </a:r>
+                      <a:endParaRPr lang="es-AR" sz="1200" b="1" i="0" u="none" strike="noStrike">
+                        <a:solidFill>
+                          <a:srgbClr val="000000"/>
+                        </a:solidFill>
+                        <a:effectLst/>
+                        <a:latin typeface="Calibri"/>
+                      </a:endParaRPr>
+                    </a:p>
+                  </a:txBody>
+                  <a:tcPr marL="7803" marR="7803" marT="7803" marB="0" anchor="ctr"/>
+                </a:tc>
+                <a:tc>
+                  <a:txBody>
+                    <a:bodyPr/>
+                    <a:lstStyle/>
+                    <a:p>
+                      <a:pPr algn="l" fontAlgn="b"/>
+                      <a:r>
+                        <a:rPr lang="es-AR" sz="1200" u="none" strike="noStrike">
+                          <a:effectLst/>
+                        </a:rPr>
+                        <a:t>Capacitación</a:t>
+                      </a:r>
+                      <a:endParaRPr lang="es-AR" sz="1200" b="0" i="0" u="none" strike="noStrike">
+                        <a:solidFill>
+                          <a:srgbClr val="000000"/>
+                        </a:solidFill>
+                        <a:effectLst/>
+                        <a:latin typeface="Calibri"/>
+                      </a:endParaRPr>
+                    </a:p>
+                  </a:txBody>
+                  <a:tcPr marL="7803" marR="7803" marT="7803" marB="0" anchor="b"/>
+                </a:tc>
+                <a:tc>
+                  <a:txBody>
+                    <a:bodyPr/>
+                    <a:lstStyle/>
+                    <a:p>
+                      <a:pPr algn="l" fontAlgn="b"/>
+                      <a:r>
+                        <a:rPr lang="es-AR" sz="1200" u="none" strike="noStrike">
+                          <a:effectLst/>
+                        </a:rPr>
+                        <a:t>Clase AC</a:t>
+                      </a:r>
+                      <a:endParaRPr lang="es-AR" sz="1200" b="0" i="0" u="none" strike="noStrike">
+                        <a:solidFill>
+                          <a:srgbClr val="000000"/>
+                        </a:solidFill>
+                        <a:effectLst/>
+                        <a:latin typeface="Calibri"/>
+                      </a:endParaRPr>
+                    </a:p>
+                  </a:txBody>
+                  <a:tcPr marL="7803" marR="7803" marT="7803" marB="0" anchor="b"/>
                 </a:tc>
                 <a:tc>
                   <a:txBody>
@@ -4151,7 +5536,7 @@
                         <a:rPr lang="es-AR" sz="1200" u="none" strike="noStrike">
                           <a:effectLst/>
                         </a:rPr>
-                        <a:t>Estacionamiento</a:t>
+                        <a:t>1</a:t>
                       </a:r>
                       <a:endParaRPr lang="es-AR" sz="1200" b="0" i="0" u="none" strike="noStrike">
                         <a:solidFill>
@@ -4162,7 +5547,65 @@
                       </a:endParaRPr>
                     </a:p>
                   </a:txBody>
-                  <a:tcPr marL="9525" marR="9525" marT="9525" marB="0" anchor="b"/>
+                  <a:tcPr marL="7803" marR="7803" marT="7803" marB="0" anchor="b"/>
+                </a:tc>
+              </a:tr>
+              <a:tr h="156068">
+                <a:tc vMerge="1">
+                  <a:txBody>
+                    <a:bodyPr/>
+                    <a:lstStyle/>
+                    <a:p>
+                      <a:endParaRPr lang="es-AR"/>
+                    </a:p>
+                  </a:txBody>
+                  <a:tcPr/>
+                </a:tc>
+                <a:tc>
+                  <a:txBody>
+                    <a:bodyPr/>
+                    <a:lstStyle/>
+                    <a:p>
+                      <a:pPr algn="l" fontAlgn="b"/>
+                      <a:r>
+                        <a:rPr lang="es-AR" sz="1200" u="none" strike="noStrike">
+                          <a:effectLst/>
+                        </a:rPr>
+                        <a:t>Entrevistas</a:t>
+                      </a:r>
+                      <a:endParaRPr lang="es-AR" sz="1200" b="0" i="0" u="none" strike="noStrike">
+                        <a:solidFill>
+                          <a:srgbClr val="000000"/>
+                        </a:solidFill>
+                        <a:effectLst/>
+                        <a:latin typeface="Calibri"/>
+                      </a:endParaRPr>
+                    </a:p>
+                  </a:txBody>
+                  <a:tcPr marL="7803" marR="7803" marT="7803" marB="0" anchor="b"/>
+                </a:tc>
+                <a:tc>
+                  <a:txBody>
+                    <a:bodyPr/>
+                    <a:lstStyle/>
+                    <a:p>
+                      <a:pPr algn="l" fontAlgn="b"/>
+                      <a:r>
+                        <a:rPr lang="es-AR" sz="1200" u="none" strike="noStrike">
+                          <a:effectLst/>
+                        </a:rPr>
+                        <a:t>Clase AC</a:t>
+                      </a:r>
+                      <a:endParaRPr lang="es-AR" sz="1200" b="0" i="0" u="none" strike="noStrike">
+                        <a:solidFill>
+                          <a:srgbClr val="000000"/>
+                        </a:solidFill>
+                        <a:effectLst/>
+                        <a:latin typeface="Calibri"/>
+                      </a:endParaRPr>
+                    </a:p>
+                  </a:txBody>
+                  <a:tcPr marL="7803" marR="7803" marT="7803" marB="0" anchor="b"/>
                 </a:tc>
                 <a:tc>
                   <a:txBody>
@@ -4174,7 +5617,7 @@
                         <a:rPr lang="es-AR" sz="1200" u="none" strike="noStrike">
                           <a:effectLst/>
                         </a:rPr>
-                        <a:t>Clase ABC</a:t>
+                        <a:t>1</a:t>
                       </a:r>
                       <a:endParaRPr lang="es-AR" sz="1200" b="0" i="0" u="none" strike="noStrike">
                         <a:solidFill>
@@ -4185,7 +5628,65 @@
                       </a:endParaRPr>
                     </a:p>
                   </a:txBody>
-                  <a:tcPr marL="9525" marR="9525" marT="9525" marB="0" anchor="b"/>
+                  <a:tcPr marL="7803" marR="7803" marT="7803" marB="0" anchor="b"/>
+                </a:tc>
+              </a:tr>
+              <a:tr h="156068">
+                <a:tc vMerge="1">
+                  <a:txBody>
+                    <a:bodyPr/>
+                    <a:lstStyle/>
+                    <a:p>
+                      <a:endParaRPr lang="es-AR"/>
+                    </a:p>
+                  </a:txBody>
+                  <a:tcPr/>
+                </a:tc>
+                <a:tc>
+                  <a:txBody>
+                    <a:bodyPr/>
+                    <a:lstStyle/>
+                    <a:p>
+                      <a:pPr algn="l" fontAlgn="b"/>
+                      <a:r>
+                        <a:rPr lang="es-AR" sz="1200" u="none" strike="noStrike">
+                          <a:effectLst/>
+                        </a:rPr>
+                        <a:t>kitchenette</a:t>
+                      </a:r>
+                      <a:endParaRPr lang="es-AR" sz="1200" b="0" i="0" u="none" strike="noStrike">
+                        <a:solidFill>
+                          <a:srgbClr val="000000"/>
+                        </a:solidFill>
+                        <a:effectLst/>
+                        <a:latin typeface="Calibri"/>
+                      </a:endParaRPr>
+                    </a:p>
+                  </a:txBody>
+                  <a:tcPr marL="7803" marR="7803" marT="7803" marB="0" anchor="b"/>
+                </a:tc>
+                <a:tc>
+                  <a:txBody>
+                    <a:bodyPr/>
+                    <a:lstStyle/>
+                    <a:p>
+                      <a:pPr algn="l" fontAlgn="b"/>
+                      <a:r>
+                        <a:rPr lang="es-AR" sz="1200" u="none" strike="noStrike">
+                          <a:effectLst/>
+                        </a:rPr>
+                        <a:t>Clase K</a:t>
+                      </a:r>
+                      <a:endParaRPr lang="es-AR" sz="1200" b="0" i="0" u="none" strike="noStrike">
+                        <a:solidFill>
+                          <a:srgbClr val="000000"/>
+                        </a:solidFill>
+                        <a:effectLst/>
+                        <a:latin typeface="Calibri"/>
+                      </a:endParaRPr>
+                    </a:p>
+                  </a:txBody>
+                  <a:tcPr marL="7803" marR="7803" marT="7803" marB="0" anchor="b"/>
                 </a:tc>
                 <a:tc>
                   <a:txBody>
@@ -4194,7 +5695,182 @@
                     <a:p>
                       <a:pPr algn="ctr" fontAlgn="b"/>
                       <a:r>
-                        <a:rPr lang="es-AR" sz="1200" u="none" strike="noStrike" dirty="0" smtClean="0">
+                        <a:rPr lang="es-AR" sz="1200" u="none" strike="noStrike">
+                          <a:effectLst/>
+                        </a:rPr>
+                        <a:t>1</a:t>
+                      </a:r>
+                      <a:endParaRPr lang="es-AR" sz="1200" b="0" i="0" u="none" strike="noStrike">
+                        <a:solidFill>
+                          <a:srgbClr val="000000"/>
+                        </a:solidFill>
+                        <a:effectLst/>
+                        <a:latin typeface="Calibri"/>
+                      </a:endParaRPr>
+                    </a:p>
+                  </a:txBody>
+                  <a:tcPr marL="7803" marR="7803" marT="7803" marB="0" anchor="b"/>
+                </a:tc>
+              </a:tr>
+              <a:tr h="156068">
+                <a:tc vMerge="1">
+                  <a:txBody>
+                    <a:bodyPr/>
+                    <a:lstStyle/>
+                    <a:p>
+                      <a:endParaRPr lang="es-AR"/>
+                    </a:p>
+                  </a:txBody>
+                  <a:tcPr/>
+                </a:tc>
+                <a:tc>
+                  <a:txBody>
+                    <a:bodyPr/>
+                    <a:lstStyle/>
+                    <a:p>
+                      <a:pPr algn="l" fontAlgn="b"/>
+                      <a:r>
+                        <a:rPr lang="es-AR" sz="1200" u="none" strike="noStrike">
+                          <a:effectLst/>
+                        </a:rPr>
+                        <a:t>Escaleras</a:t>
+                      </a:r>
+                      <a:endParaRPr lang="es-AR" sz="1200" b="0" i="0" u="none" strike="noStrike">
+                        <a:solidFill>
+                          <a:srgbClr val="000000"/>
+                        </a:solidFill>
+                        <a:effectLst/>
+                        <a:latin typeface="Calibri"/>
+                      </a:endParaRPr>
+                    </a:p>
+                  </a:txBody>
+                  <a:tcPr marL="7803" marR="7803" marT="7803" marB="0" anchor="b"/>
+                </a:tc>
+                <a:tc>
+                  <a:txBody>
+                    <a:bodyPr/>
+                    <a:lstStyle/>
+                    <a:p>
+                      <a:pPr algn="l" fontAlgn="b"/>
+                      <a:r>
+                        <a:rPr lang="es-AR" sz="1200" u="none" strike="noStrike">
+                          <a:effectLst/>
+                        </a:rPr>
+                        <a:t>Clase AC</a:t>
+                      </a:r>
+                      <a:endParaRPr lang="es-AR" sz="1200" b="0" i="0" u="none" strike="noStrike">
+                        <a:solidFill>
+                          <a:srgbClr val="000000"/>
+                        </a:solidFill>
+                        <a:effectLst/>
+                        <a:latin typeface="Calibri"/>
+                      </a:endParaRPr>
+                    </a:p>
+                  </a:txBody>
+                  <a:tcPr marL="7803" marR="7803" marT="7803" marB="0" anchor="b"/>
+                </a:tc>
+                <a:tc>
+                  <a:txBody>
+                    <a:bodyPr/>
+                    <a:lstStyle/>
+                    <a:p>
+                      <a:pPr algn="ctr" fontAlgn="b"/>
+                      <a:r>
+                        <a:rPr lang="es-AR" sz="1200" u="none" strike="noStrike" dirty="0">
+                          <a:effectLst/>
+                        </a:rPr>
+                        <a:t>1</a:t>
+                      </a:r>
+                      <a:endParaRPr lang="es-AR" sz="1200" b="0" i="0" u="none" strike="noStrike" dirty="0">
+                        <a:solidFill>
+                          <a:srgbClr val="000000"/>
+                        </a:solidFill>
+                        <a:effectLst/>
+                        <a:latin typeface="Calibri"/>
+                      </a:endParaRPr>
+                    </a:p>
+                  </a:txBody>
+                  <a:tcPr marL="7803" marR="7803" marT="7803" marB="0" anchor="b"/>
+                </a:tc>
+              </a:tr>
+              <a:tr h="156068">
+                <a:tc rowSpan="3">
+                  <a:txBody>
+                    <a:bodyPr/>
+                    <a:lstStyle/>
+                    <a:p>
+                      <a:pPr algn="ctr" fontAlgn="ctr"/>
+                      <a:r>
+                        <a:rPr lang="es-AR" sz="1200" b="1" u="none" strike="noStrike">
+                          <a:effectLst/>
+                        </a:rPr>
+                        <a:t>Cuarto Piso</a:t>
+                      </a:r>
+                      <a:endParaRPr lang="es-AR" sz="1200" b="1" i="0" u="none" strike="noStrike">
+                        <a:solidFill>
+                          <a:srgbClr val="000000"/>
+                        </a:solidFill>
+                        <a:effectLst/>
+                        <a:latin typeface="Calibri"/>
+                      </a:endParaRPr>
+                    </a:p>
+                  </a:txBody>
+                  <a:tcPr marL="7803" marR="7803" marT="7803" marB="0" anchor="ctr"/>
+                </a:tc>
+                <a:tc>
+                  <a:txBody>
+                    <a:bodyPr/>
+                    <a:lstStyle/>
+                    <a:p>
+                      <a:pPr algn="l" fontAlgn="b"/>
+                      <a:r>
+                        <a:rPr lang="es-AR" sz="1200" u="none" strike="noStrike">
+                          <a:effectLst/>
+                        </a:rPr>
+                        <a:t>Sistemas</a:t>
+                      </a:r>
+                      <a:endParaRPr lang="es-AR" sz="1200" b="0" i="0" u="none" strike="noStrike">
+                        <a:solidFill>
+                          <a:srgbClr val="000000"/>
+                        </a:solidFill>
+                        <a:effectLst/>
+                        <a:latin typeface="Calibri"/>
+                      </a:endParaRPr>
+                    </a:p>
+                  </a:txBody>
+                  <a:tcPr marL="7803" marR="7803" marT="7803" marB="0" anchor="b"/>
+                </a:tc>
+                <a:tc>
+                  <a:txBody>
+                    <a:bodyPr/>
+                    <a:lstStyle/>
+                    <a:p>
+                      <a:pPr algn="l" fontAlgn="b"/>
+                      <a:r>
+                        <a:rPr lang="es-AR" sz="1200" u="none" strike="noStrike">
+                          <a:effectLst/>
+                        </a:rPr>
+                        <a:t>Clase AC</a:t>
+                      </a:r>
+                      <a:endParaRPr lang="es-AR" sz="1200" b="0" i="0" u="none" strike="noStrike">
+                        <a:solidFill>
+                          <a:srgbClr val="000000"/>
+                        </a:solidFill>
+                        <a:effectLst/>
+                        <a:latin typeface="Calibri"/>
+                      </a:endParaRPr>
+                    </a:p>
+                  </a:txBody>
+                  <a:tcPr marL="7803" marR="7803" marT="7803" marB="0" anchor="b"/>
+                </a:tc>
+                <a:tc>
+                  <a:txBody>
+                    <a:bodyPr/>
+                    <a:lstStyle/>
+                    <a:p>
+                      <a:pPr algn="ctr" fontAlgn="b"/>
+                      <a:r>
+                        <a:rPr lang="es-AR" sz="1200" u="none" strike="noStrike" dirty="0">
                           <a:effectLst/>
                         </a:rPr>
                         <a:t>2</a:t>
@@ -4208,10 +5884,66 @@
                       </a:endParaRPr>
                     </a:p>
                   </a:txBody>
-                  <a:tcPr marL="9525" marR="9525" marT="9525" marB="0" anchor="b"/>
+                  <a:tcPr marL="7803" marR="7803" marT="7803" marB="0" anchor="b"/>
                 </a:tc>
               </a:tr>
-              <a:tr h="339458">
+              <a:tr h="156068">
+                <a:tc vMerge="1">
+                  <a:txBody>
+                    <a:bodyPr/>
+                    <a:lstStyle/>
+                    <a:p>
+                      <a:endParaRPr lang="es-AR"/>
+                    </a:p>
+                  </a:txBody>
+                  <a:tcPr/>
+                </a:tc>
+                <a:tc>
+                  <a:txBody>
+                    <a:bodyPr/>
+                    <a:lstStyle/>
+                    <a:p>
+                      <a:pPr algn="l" fontAlgn="b"/>
+                      <a:r>
+                        <a:rPr lang="es-AR" sz="1200" u="none" strike="noStrike">
+                          <a:effectLst/>
+                        </a:rPr>
+                        <a:t>kitchenette</a:t>
+                      </a:r>
+                      <a:endParaRPr lang="es-AR" sz="1200" b="0" i="0" u="none" strike="noStrike">
+                        <a:solidFill>
+                          <a:srgbClr val="000000"/>
+                        </a:solidFill>
+                        <a:effectLst/>
+                        <a:latin typeface="Calibri"/>
+                      </a:endParaRPr>
+                    </a:p>
+                  </a:txBody>
+                  <a:tcPr marL="7803" marR="7803" marT="7803" marB="0" anchor="b"/>
+                </a:tc>
+                <a:tc>
+                  <a:txBody>
+                    <a:bodyPr/>
+                    <a:lstStyle/>
+                    <a:p>
+                      <a:pPr algn="l" fontAlgn="b"/>
+                      <a:r>
+                        <a:rPr lang="es-AR" sz="1200" u="none" strike="noStrike">
+                          <a:effectLst/>
+                        </a:rPr>
+                        <a:t>Clase K</a:t>
+                      </a:r>
+                      <a:endParaRPr lang="es-AR" sz="1200" b="0" i="0" u="none" strike="noStrike">
+                        <a:solidFill>
+                          <a:srgbClr val="000000"/>
+                        </a:solidFill>
+                        <a:effectLst/>
+                        <a:latin typeface="Calibri"/>
+                      </a:endParaRPr>
+                    </a:p>
+                  </a:txBody>
+                  <a:tcPr marL="7803" marR="7803" marT="7803" marB="0" anchor="b"/>
+                </a:tc>
                 <a:tc>
                   <a:txBody>
                     <a:bodyPr/>
@@ -4219,21 +5951,79 @@
                     <a:p>
                       <a:pPr algn="ctr" fontAlgn="b"/>
                       <a:r>
-                        <a:rPr lang="es-AR" sz="1400" b="1" u="none" strike="noStrike" dirty="0">
-                          <a:effectLst/>
-                        </a:rPr>
-                        <a:t>Segundo Subsuelo</a:t>
-                      </a:r>
-                      <a:endParaRPr lang="es-AR" sz="1400" b="1" i="0" u="none" strike="noStrike" dirty="0">
-                        <a:solidFill>
-                          <a:srgbClr val="000000"/>
-                        </a:solidFill>
-                        <a:effectLst/>
-                        <a:latin typeface="Calibri"/>
-                      </a:endParaRPr>
-                    </a:p>
-                  </a:txBody>
-                  <a:tcPr marL="9525" marR="9525" marT="9525" marB="0" anchor="b"/>
+                        <a:rPr lang="es-AR" sz="1200" u="none" strike="noStrike" dirty="0">
+                          <a:effectLst/>
+                        </a:rPr>
+                        <a:t>1</a:t>
+                      </a:r>
+                      <a:endParaRPr lang="es-AR" sz="1200" b="0" i="0" u="none" strike="noStrike" dirty="0">
+                        <a:solidFill>
+                          <a:srgbClr val="000000"/>
+                        </a:solidFill>
+                        <a:effectLst/>
+                        <a:latin typeface="Calibri"/>
+                      </a:endParaRPr>
+                    </a:p>
+                  </a:txBody>
+                  <a:tcPr marL="7803" marR="7803" marT="7803" marB="0" anchor="b"/>
+                </a:tc>
+              </a:tr>
+              <a:tr h="156068">
+                <a:tc vMerge="1">
+                  <a:txBody>
+                    <a:bodyPr/>
+                    <a:lstStyle/>
+                    <a:p>
+                      <a:endParaRPr lang="es-AR"/>
+                    </a:p>
+                  </a:txBody>
+                  <a:tcPr/>
+                </a:tc>
+                <a:tc>
+                  <a:txBody>
+                    <a:bodyPr/>
+                    <a:lstStyle/>
+                    <a:p>
+                      <a:pPr algn="l" fontAlgn="b"/>
+                      <a:r>
+                        <a:rPr lang="es-AR" sz="1200" u="none" strike="noStrike">
+                          <a:effectLst/>
+                        </a:rPr>
+                        <a:t>Escaleras</a:t>
+                      </a:r>
+                      <a:endParaRPr lang="es-AR" sz="1200" b="0" i="0" u="none" strike="noStrike">
+                        <a:solidFill>
+                          <a:srgbClr val="000000"/>
+                        </a:solidFill>
+                        <a:effectLst/>
+                        <a:latin typeface="Calibri"/>
+                      </a:endParaRPr>
+                    </a:p>
+                  </a:txBody>
+                  <a:tcPr marL="7803" marR="7803" marT="7803" marB="0" anchor="b"/>
+                </a:tc>
+                <a:tc>
+                  <a:txBody>
+                    <a:bodyPr/>
+                    <a:lstStyle/>
+                    <a:p>
+                      <a:pPr algn="l" fontAlgn="b"/>
+                      <a:r>
+                        <a:rPr lang="es-AR" sz="1200" u="none" strike="noStrike">
+                          <a:effectLst/>
+                        </a:rPr>
+                        <a:t>Clase AC</a:t>
+                      </a:r>
+                      <a:endParaRPr lang="es-AR" sz="1200" b="0" i="0" u="none" strike="noStrike">
+                        <a:solidFill>
+                          <a:srgbClr val="000000"/>
+                        </a:solidFill>
+                        <a:effectLst/>
+                        <a:latin typeface="Calibri"/>
+                      </a:endParaRPr>
+                    </a:p>
+                  </a:txBody>
+                  <a:tcPr marL="7803" marR="7803" marT="7803" marB="0" anchor="b"/>
                 </a:tc>
                 <a:tc>
                   <a:txBody>
@@ -4242,10 +6032,58 @@
                     <a:p>
                       <a:pPr algn="ctr" fontAlgn="b"/>
                       <a:r>
+                        <a:rPr lang="es-AR" sz="1200" u="none" strike="noStrike" dirty="0">
+                          <a:effectLst/>
+                        </a:rPr>
+                        <a:t>1</a:t>
+                      </a:r>
+                      <a:endParaRPr lang="es-AR" sz="1200" b="0" i="0" u="none" strike="noStrike" dirty="0">
+                        <a:solidFill>
+                          <a:srgbClr val="000000"/>
+                        </a:solidFill>
+                        <a:effectLst/>
+                        <a:latin typeface="Calibri"/>
+                      </a:endParaRPr>
+                    </a:p>
+                  </a:txBody>
+                  <a:tcPr marL="7803" marR="7803" marT="7803" marB="0" anchor="b"/>
+                </a:tc>
+              </a:tr>
+              <a:tr h="156068">
+                <a:tc rowSpan="4">
+                  <a:txBody>
+                    <a:bodyPr/>
+                    <a:lstStyle/>
+                    <a:p>
+                      <a:pPr algn="ctr" fontAlgn="ctr"/>
+                      <a:r>
+                        <a:rPr lang="es-AR" sz="1200" b="1" u="none" strike="noStrike" dirty="0">
+                          <a:effectLst/>
+                        </a:rPr>
+                        <a:t>Quinto Piso</a:t>
+                      </a:r>
+                      <a:endParaRPr lang="es-AR" sz="1200" b="1" i="0" u="none" strike="noStrike" dirty="0">
+                        <a:solidFill>
+                          <a:srgbClr val="000000"/>
+                        </a:solidFill>
+                        <a:effectLst/>
+                        <a:latin typeface="Calibri"/>
+                      </a:endParaRPr>
+                    </a:p>
+                  </a:txBody>
+                  <a:tcPr marL="7803" marR="7803" marT="7803" marB="0" anchor="ctr"/>
+                </a:tc>
+                <a:tc>
+                  <a:txBody>
+                    <a:bodyPr/>
+                    <a:lstStyle/>
+                    <a:p>
+                      <a:pPr algn="l" fontAlgn="b"/>
+                      <a:r>
                         <a:rPr lang="es-AR" sz="1200" u="none" strike="noStrike">
                           <a:effectLst/>
                         </a:rPr>
-                        <a:t>Estacionamiento</a:t>
+                        <a:t>Gerencia General</a:t>
                       </a:r>
                       <a:endParaRPr lang="es-AR" sz="1200" b="0" i="0" u="none" strike="noStrike">
                         <a:solidFill>
@@ -4256,7 +6094,30 @@
                       </a:endParaRPr>
                     </a:p>
                   </a:txBody>
-                  <a:tcPr marL="9525" marR="9525" marT="9525" marB="0" anchor="b"/>
+                  <a:tcPr marL="7803" marR="7803" marT="7803" marB="0" anchor="b"/>
+                </a:tc>
+                <a:tc>
+                  <a:txBody>
+                    <a:bodyPr/>
+                    <a:lstStyle/>
+                    <a:p>
+                      <a:pPr algn="l" fontAlgn="b"/>
+                      <a:r>
+                        <a:rPr lang="es-AR" sz="1200" u="none" strike="noStrike">
+                          <a:effectLst/>
+                        </a:rPr>
+                        <a:t>Clase AC</a:t>
+                      </a:r>
+                      <a:endParaRPr lang="es-AR" sz="1200" b="0" i="0" u="none" strike="noStrike">
+                        <a:solidFill>
+                          <a:srgbClr val="000000"/>
+                        </a:solidFill>
+                        <a:effectLst/>
+                        <a:latin typeface="Calibri"/>
+                      </a:endParaRPr>
+                    </a:p>
+                  </a:txBody>
+                  <a:tcPr marL="7803" marR="7803" marT="7803" marB="0" anchor="b"/>
                 </a:tc>
                 <a:tc>
                   <a:txBody>
@@ -4265,10 +6126,45 @@
                     <a:p>
                       <a:pPr algn="ctr" fontAlgn="b"/>
                       <a:r>
+                        <a:rPr lang="es-AR" sz="1200" u="none" strike="noStrike" dirty="0">
+                          <a:effectLst/>
+                        </a:rPr>
+                        <a:t>1</a:t>
+                      </a:r>
+                      <a:endParaRPr lang="es-AR" sz="1200" b="0" i="0" u="none" strike="noStrike" dirty="0">
+                        <a:solidFill>
+                          <a:srgbClr val="000000"/>
+                        </a:solidFill>
+                        <a:effectLst/>
+                        <a:latin typeface="Calibri"/>
+                      </a:endParaRPr>
+                    </a:p>
+                  </a:txBody>
+                  <a:tcPr marL="7803" marR="7803" marT="7803" marB="0" anchor="b"/>
+                </a:tc>
+              </a:tr>
+              <a:tr h="156068">
+                <a:tc vMerge="1">
+                  <a:txBody>
+                    <a:bodyPr/>
+                    <a:lstStyle/>
+                    <a:p>
+                      <a:endParaRPr lang="es-AR"/>
+                    </a:p>
+                  </a:txBody>
+                  <a:tcPr/>
+                </a:tc>
+                <a:tc>
+                  <a:txBody>
+                    <a:bodyPr/>
+                    <a:lstStyle/>
+                    <a:p>
+                      <a:pPr algn="l" fontAlgn="b"/>
+                      <a:r>
                         <a:rPr lang="es-AR" sz="1200" u="none" strike="noStrike">
                           <a:effectLst/>
                         </a:rPr>
-                        <a:t>Clase ABC</a:t>
+                        <a:t>kitchenette</a:t>
                       </a:r>
                       <a:endParaRPr lang="es-AR" sz="1200" b="0" i="0" u="none" strike="noStrike">
                         <a:solidFill>
@@ -4279,7 +6175,30 @@
                       </a:endParaRPr>
                     </a:p>
                   </a:txBody>
-                  <a:tcPr marL="9525" marR="9525" marT="9525" marB="0" anchor="b"/>
+                  <a:tcPr marL="7803" marR="7803" marT="7803" marB="0" anchor="b"/>
+                </a:tc>
+                <a:tc>
+                  <a:txBody>
+                    <a:bodyPr/>
+                    <a:lstStyle/>
+                    <a:p>
+                      <a:pPr algn="l" fontAlgn="b"/>
+                      <a:r>
+                        <a:rPr lang="es-AR" sz="1200" u="none" strike="noStrike">
+                          <a:effectLst/>
+                        </a:rPr>
+                        <a:t>Clase K</a:t>
+                      </a:r>
+                      <a:endParaRPr lang="es-AR" sz="1200" b="0" i="0" u="none" strike="noStrike">
+                        <a:solidFill>
+                          <a:srgbClr val="000000"/>
+                        </a:solidFill>
+                        <a:effectLst/>
+                        <a:latin typeface="Calibri"/>
+                      </a:endParaRPr>
+                    </a:p>
+                  </a:txBody>
+                  <a:tcPr marL="7803" marR="7803" marT="7803" marB="0" anchor="b"/>
                 </a:tc>
                 <a:tc>
                   <a:txBody>
@@ -4288,10 +6207,10 @@
                     <a:p>
                       <a:pPr algn="ctr" fontAlgn="b"/>
                       <a:r>
-                        <a:rPr lang="es-AR" sz="1200" u="none" strike="noStrike" dirty="0" smtClean="0">
-                          <a:effectLst/>
-                        </a:rPr>
-                        <a:t>2</a:t>
+                        <a:rPr lang="es-AR" sz="1200" u="none" strike="noStrike" dirty="0">
+                          <a:effectLst/>
+                        </a:rPr>
+                        <a:t>1</a:t>
                       </a:r>
                       <a:endParaRPr lang="es-AR" sz="1200" b="0" i="0" u="none" strike="noStrike" dirty="0">
                         <a:solidFill>
@@ -4302,32 +6221,65 @@
                       </a:endParaRPr>
                     </a:p>
                   </a:txBody>
-                  <a:tcPr marL="9525" marR="9525" marT="9525" marB="0" anchor="b"/>
+                  <a:tcPr marL="7803" marR="7803" marT="7803" marB="0" anchor="b"/>
                 </a:tc>
               </a:tr>
-              <a:tr h="198672">
-                <a:tc rowSpan="3">
-                  <a:txBody>
-                    <a:bodyPr/>
-                    <a:lstStyle/>
-                    <a:p>
-                      <a:pPr algn="ctr" fontAlgn="ctr"/>
-                      <a:r>
-                        <a:rPr lang="es-AR" sz="1400" b="1" u="none" strike="noStrike" dirty="0">
-                          <a:effectLst/>
-                        </a:rPr>
-                        <a:t>Planta Baja </a:t>
-                      </a:r>
-                      <a:endParaRPr lang="es-AR" sz="1400" b="1" i="0" u="none" strike="noStrike" dirty="0">
-                        <a:solidFill>
-                          <a:srgbClr val="000000"/>
-                        </a:solidFill>
-                        <a:effectLst/>
-                        <a:latin typeface="Calibri"/>
-                      </a:endParaRPr>
-                    </a:p>
-                  </a:txBody>
-                  <a:tcPr marL="9525" marR="9525" marT="9525" marB="0" anchor="ctr"/>
+              <a:tr h="156068">
+                <a:tc vMerge="1">
+                  <a:txBody>
+                    <a:bodyPr/>
+                    <a:lstStyle/>
+                    <a:p>
+                      <a:endParaRPr lang="es-AR"/>
+                    </a:p>
+                  </a:txBody>
+                  <a:tcPr/>
+                </a:tc>
+                <a:tc>
+                  <a:txBody>
+                    <a:bodyPr/>
+                    <a:lstStyle/>
+                    <a:p>
+                      <a:pPr algn="l" fontAlgn="b"/>
+                      <a:r>
+                        <a:rPr lang="es-AR" sz="1200" u="none" strike="noStrike">
+                          <a:effectLst/>
+                        </a:rPr>
+                        <a:t>Sala de Reuniones</a:t>
+                      </a:r>
+                      <a:endParaRPr lang="es-AR" sz="1200" b="0" i="0" u="none" strike="noStrike">
+                        <a:solidFill>
+                          <a:srgbClr val="000000"/>
+                        </a:solidFill>
+                        <a:effectLst/>
+                        <a:latin typeface="Calibri"/>
+                      </a:endParaRPr>
+                    </a:p>
+                  </a:txBody>
+                  <a:tcPr marL="7803" marR="7803" marT="7803" marB="0" anchor="b"/>
+                </a:tc>
+                <a:tc>
+                  <a:txBody>
+                    <a:bodyPr/>
+                    <a:lstStyle/>
+                    <a:p>
+                      <a:pPr algn="l" fontAlgn="b"/>
+                      <a:r>
+                        <a:rPr lang="es-AR" sz="1200" u="none" strike="noStrike">
+                          <a:effectLst/>
+                        </a:rPr>
+                        <a:t>Clase AC</a:t>
+                      </a:r>
+                      <a:endParaRPr lang="es-AR" sz="1200" b="0" i="0" u="none" strike="noStrike">
+                        <a:solidFill>
+                          <a:srgbClr val="000000"/>
+                        </a:solidFill>
+                        <a:effectLst/>
+                        <a:latin typeface="Calibri"/>
+                      </a:endParaRPr>
+                    </a:p>
+                  </a:txBody>
+                  <a:tcPr marL="7803" marR="7803" marT="7803" marB="0" anchor="b"/>
                 </a:tc>
                 <a:tc>
                   <a:txBody>
@@ -4339,7 +6291,7 @@
                         <a:rPr lang="es-AR" sz="1200" u="none" strike="noStrike">
                           <a:effectLst/>
                         </a:rPr>
-                        <a:t>Buffet</a:t>
+                        <a:t>1</a:t>
                       </a:r>
                       <a:endParaRPr lang="es-AR" sz="1200" b="0" i="0" u="none" strike="noStrike">
                         <a:solidFill>
@@ -4350,7 +6302,65 @@
                       </a:endParaRPr>
                     </a:p>
                   </a:txBody>
-                  <a:tcPr marL="9525" marR="9525" marT="9525" marB="0" anchor="b"/>
+                  <a:tcPr marL="7803" marR="7803" marT="7803" marB="0" anchor="b"/>
+                </a:tc>
+              </a:tr>
+              <a:tr h="156068">
+                <a:tc vMerge="1">
+                  <a:txBody>
+                    <a:bodyPr/>
+                    <a:lstStyle/>
+                    <a:p>
+                      <a:endParaRPr lang="es-AR"/>
+                    </a:p>
+                  </a:txBody>
+                  <a:tcPr/>
+                </a:tc>
+                <a:tc>
+                  <a:txBody>
+                    <a:bodyPr/>
+                    <a:lstStyle/>
+                    <a:p>
+                      <a:pPr algn="l" fontAlgn="b"/>
+                      <a:r>
+                        <a:rPr lang="es-AR" sz="1200" u="none" strike="noStrike">
+                          <a:effectLst/>
+                        </a:rPr>
+                        <a:t>Escaleras</a:t>
+                      </a:r>
+                      <a:endParaRPr lang="es-AR" sz="1200" b="0" i="0" u="none" strike="noStrike">
+                        <a:solidFill>
+                          <a:srgbClr val="000000"/>
+                        </a:solidFill>
+                        <a:effectLst/>
+                        <a:latin typeface="Calibri"/>
+                      </a:endParaRPr>
+                    </a:p>
+                  </a:txBody>
+                  <a:tcPr marL="7803" marR="7803" marT="7803" marB="0" anchor="b"/>
+                </a:tc>
+                <a:tc>
+                  <a:txBody>
+                    <a:bodyPr/>
+                    <a:lstStyle/>
+                    <a:p>
+                      <a:pPr algn="l" fontAlgn="b"/>
+                      <a:r>
+                        <a:rPr lang="es-AR" sz="1200" u="none" strike="noStrike">
+                          <a:effectLst/>
+                        </a:rPr>
+                        <a:t>Clase AC</a:t>
+                      </a:r>
+                      <a:endParaRPr lang="es-AR" sz="1200" b="0" i="0" u="none" strike="noStrike">
+                        <a:solidFill>
+                          <a:srgbClr val="000000"/>
+                        </a:solidFill>
+                        <a:effectLst/>
+                        <a:latin typeface="Calibri"/>
+                      </a:endParaRPr>
+                    </a:p>
+                  </a:txBody>
+                  <a:tcPr marL="7803" marR="7803" marT="7803" marB="0" anchor="b"/>
                 </a:tc>
                 <a:tc>
                   <a:txBody>
@@ -4359,33 +6369,10 @@
                     <a:p>
                       <a:pPr algn="ctr" fontAlgn="b"/>
                       <a:r>
-                        <a:rPr lang="es-AR" sz="1200" u="none" strike="noStrike">
-                          <a:effectLst/>
-                        </a:rPr>
-                        <a:t>Clase K, Clase AC</a:t>
-                      </a:r>
-                      <a:endParaRPr lang="es-AR" sz="1200" b="0" i="0" u="none" strike="noStrike">
-                        <a:solidFill>
-                          <a:srgbClr val="000000"/>
-                        </a:solidFill>
-                        <a:effectLst/>
-                        <a:latin typeface="Calibri"/>
-                      </a:endParaRPr>
-                    </a:p>
-                  </a:txBody>
-                  <a:tcPr marL="9525" marR="9525" marT="9525" marB="0" anchor="b"/>
-                </a:tc>
-                <a:tc>
-                  <a:txBody>
-                    <a:bodyPr/>
-                    <a:lstStyle/>
-                    <a:p>
-                      <a:pPr algn="ctr" fontAlgn="b"/>
-                      <a:r>
                         <a:rPr lang="es-AR" sz="1200" u="none" strike="noStrike" dirty="0">
                           <a:effectLst/>
                         </a:rPr>
-                        <a:t>2</a:t>
+                        <a:t>1</a:t>
                       </a:r>
                       <a:endParaRPr lang="es-AR" sz="1200" b="0" i="0" u="none" strike="noStrike" dirty="0">
                         <a:solidFill>
@@ -4396,1530 +6383,7 @@
                       </a:endParaRPr>
                     </a:p>
                   </a:txBody>
-                  <a:tcPr marL="9525" marR="9525" marT="9525" marB="0" anchor="b"/>
-                </a:tc>
-              </a:tr>
-              <a:tr h="198672">
-                <a:tc vMerge="1">
-                  <a:txBody>
-                    <a:bodyPr/>
-                    <a:lstStyle/>
-                    <a:p>
-                      <a:endParaRPr lang="es-AR"/>
-                    </a:p>
-                  </a:txBody>
-                  <a:tcPr/>
-                </a:tc>
-                <a:tc>
-                  <a:txBody>
-                    <a:bodyPr/>
-                    <a:lstStyle/>
-                    <a:p>
-                      <a:pPr algn="ctr" fontAlgn="b"/>
-                      <a:r>
-                        <a:rPr lang="es-AR" sz="1200" u="none" strike="noStrike">
-                          <a:effectLst/>
-                        </a:rPr>
-                        <a:t>Servidores</a:t>
-                      </a:r>
-                      <a:endParaRPr lang="es-AR" sz="1200" b="0" i="0" u="none" strike="noStrike">
-                        <a:solidFill>
-                          <a:srgbClr val="000000"/>
-                        </a:solidFill>
-                        <a:effectLst/>
-                        <a:latin typeface="Calibri"/>
-                      </a:endParaRPr>
-                    </a:p>
-                  </a:txBody>
-                  <a:tcPr marL="9525" marR="9525" marT="9525" marB="0" anchor="b"/>
-                </a:tc>
-                <a:tc>
-                  <a:txBody>
-                    <a:bodyPr/>
-                    <a:lstStyle/>
-                    <a:p>
-                      <a:pPr algn="ctr" fontAlgn="b"/>
-                      <a:r>
-                        <a:rPr lang="es-AR" sz="1200" u="none" strike="noStrike">
-                          <a:effectLst/>
-                        </a:rPr>
-                        <a:t>Clase AC</a:t>
-                      </a:r>
-                      <a:endParaRPr lang="es-AR" sz="1200" b="0" i="0" u="none" strike="noStrike">
-                        <a:solidFill>
-                          <a:srgbClr val="000000"/>
-                        </a:solidFill>
-                        <a:effectLst/>
-                        <a:latin typeface="Calibri"/>
-                      </a:endParaRPr>
-                    </a:p>
-                  </a:txBody>
-                  <a:tcPr marL="9525" marR="9525" marT="9525" marB="0" anchor="b"/>
-                </a:tc>
-                <a:tc>
-                  <a:txBody>
-                    <a:bodyPr/>
-                    <a:lstStyle/>
-                    <a:p>
-                      <a:pPr algn="ctr" fontAlgn="b"/>
-                      <a:r>
-                        <a:rPr lang="es-AR" sz="1200" u="none" strike="noStrike" dirty="0">
-                          <a:effectLst/>
-                        </a:rPr>
-                        <a:t>1</a:t>
-                      </a:r>
-                      <a:endParaRPr lang="es-AR" sz="1200" b="0" i="0" u="none" strike="noStrike" dirty="0">
-                        <a:solidFill>
-                          <a:srgbClr val="000000"/>
-                        </a:solidFill>
-                        <a:effectLst/>
-                        <a:latin typeface="Calibri"/>
-                      </a:endParaRPr>
-                    </a:p>
-                  </a:txBody>
-                  <a:tcPr marL="9525" marR="9525" marT="9525" marB="0" anchor="b"/>
-                </a:tc>
-              </a:tr>
-              <a:tr h="198672">
-                <a:tc vMerge="1">
-                  <a:txBody>
-                    <a:bodyPr/>
-                    <a:lstStyle/>
-                    <a:p>
-                      <a:endParaRPr lang="es-AR"/>
-                    </a:p>
-                  </a:txBody>
-                  <a:tcPr/>
-                </a:tc>
-                <a:tc>
-                  <a:txBody>
-                    <a:bodyPr/>
-                    <a:lstStyle/>
-                    <a:p>
-                      <a:pPr algn="ctr" fontAlgn="b"/>
-                      <a:r>
-                        <a:rPr lang="es-AR" sz="1200" u="none" strike="noStrike">
-                          <a:effectLst/>
-                        </a:rPr>
-                        <a:t>Mantenimiento</a:t>
-                      </a:r>
-                      <a:endParaRPr lang="es-AR" sz="1200" b="0" i="0" u="none" strike="noStrike">
-                        <a:solidFill>
-                          <a:srgbClr val="000000"/>
-                        </a:solidFill>
-                        <a:effectLst/>
-                        <a:latin typeface="Calibri"/>
-                      </a:endParaRPr>
-                    </a:p>
-                  </a:txBody>
-                  <a:tcPr marL="9525" marR="9525" marT="9525" marB="0" anchor="b"/>
-                </a:tc>
-                <a:tc>
-                  <a:txBody>
-                    <a:bodyPr/>
-                    <a:lstStyle/>
-                    <a:p>
-                      <a:pPr algn="ctr" fontAlgn="b"/>
-                      <a:r>
-                        <a:rPr lang="es-AR" sz="1200" u="none" strike="noStrike">
-                          <a:effectLst/>
-                        </a:rPr>
-                        <a:t>Clase ABC</a:t>
-                      </a:r>
-                      <a:endParaRPr lang="es-AR" sz="1200" b="0" i="0" u="none" strike="noStrike">
-                        <a:solidFill>
-                          <a:srgbClr val="000000"/>
-                        </a:solidFill>
-                        <a:effectLst/>
-                        <a:latin typeface="Calibri"/>
-                      </a:endParaRPr>
-                    </a:p>
-                  </a:txBody>
-                  <a:tcPr marL="9525" marR="9525" marT="9525" marB="0" anchor="b"/>
-                </a:tc>
-                <a:tc>
-                  <a:txBody>
-                    <a:bodyPr/>
-                    <a:lstStyle/>
-                    <a:p>
-                      <a:pPr algn="ctr" fontAlgn="b"/>
-                      <a:r>
-                        <a:rPr lang="es-AR" sz="1200" u="none" strike="noStrike" dirty="0">
-                          <a:effectLst/>
-                        </a:rPr>
-                        <a:t>1</a:t>
-                      </a:r>
-                      <a:endParaRPr lang="es-AR" sz="1200" b="0" i="0" u="none" strike="noStrike" dirty="0">
-                        <a:solidFill>
-                          <a:srgbClr val="000000"/>
-                        </a:solidFill>
-                        <a:effectLst/>
-                        <a:latin typeface="Calibri"/>
-                      </a:endParaRPr>
-                    </a:p>
-                  </a:txBody>
-                  <a:tcPr marL="9525" marR="9525" marT="9525" marB="0" anchor="b"/>
-                </a:tc>
-              </a:tr>
-              <a:tr h="198672">
-                <a:tc rowSpan="3">
-                  <a:txBody>
-                    <a:bodyPr/>
-                    <a:lstStyle/>
-                    <a:p>
-                      <a:pPr algn="ctr" fontAlgn="ctr"/>
-                      <a:r>
-                        <a:rPr lang="es-AR" sz="1400" b="1" u="none" strike="noStrike" dirty="0">
-                          <a:effectLst/>
-                        </a:rPr>
-                        <a:t>Primer Piso</a:t>
-                      </a:r>
-                      <a:endParaRPr lang="es-AR" sz="1400" b="1" i="0" u="none" strike="noStrike" dirty="0">
-                        <a:solidFill>
-                          <a:srgbClr val="000000"/>
-                        </a:solidFill>
-                        <a:effectLst/>
-                        <a:latin typeface="Calibri"/>
-                      </a:endParaRPr>
-                    </a:p>
-                  </a:txBody>
-                  <a:tcPr marL="9525" marR="9525" marT="9525" marB="0" anchor="ctr"/>
-                </a:tc>
-                <a:tc>
-                  <a:txBody>
-                    <a:bodyPr/>
-                    <a:lstStyle/>
-                    <a:p>
-                      <a:pPr algn="ctr" fontAlgn="b"/>
-                      <a:r>
-                        <a:rPr lang="es-AR" sz="1200" u="none" strike="noStrike">
-                          <a:effectLst/>
-                        </a:rPr>
-                        <a:t>Producto</a:t>
-                      </a:r>
-                      <a:endParaRPr lang="es-AR" sz="1200" b="0" i="0" u="none" strike="noStrike">
-                        <a:solidFill>
-                          <a:srgbClr val="000000"/>
-                        </a:solidFill>
-                        <a:effectLst/>
-                        <a:latin typeface="Calibri"/>
-                      </a:endParaRPr>
-                    </a:p>
-                  </a:txBody>
-                  <a:tcPr marL="9525" marR="9525" marT="9525" marB="0" anchor="b"/>
-                </a:tc>
-                <a:tc>
-                  <a:txBody>
-                    <a:bodyPr/>
-                    <a:lstStyle/>
-                    <a:p>
-                      <a:pPr algn="ctr" fontAlgn="b"/>
-                      <a:r>
-                        <a:rPr lang="es-AR" sz="1200" u="none" strike="noStrike">
-                          <a:effectLst/>
-                        </a:rPr>
-                        <a:t>Clase AC</a:t>
-                      </a:r>
-                      <a:endParaRPr lang="es-AR" sz="1200" b="0" i="0" u="none" strike="noStrike">
-                        <a:solidFill>
-                          <a:srgbClr val="000000"/>
-                        </a:solidFill>
-                        <a:effectLst/>
-                        <a:latin typeface="Calibri"/>
-                      </a:endParaRPr>
-                    </a:p>
-                  </a:txBody>
-                  <a:tcPr marL="9525" marR="9525" marT="9525" marB="0" anchor="b"/>
-                </a:tc>
-                <a:tc>
-                  <a:txBody>
-                    <a:bodyPr/>
-                    <a:lstStyle/>
-                    <a:p>
-                      <a:pPr algn="ctr" fontAlgn="b"/>
-                      <a:r>
-                        <a:rPr lang="es-AR" sz="1200" u="none" strike="noStrike" dirty="0">
-                          <a:effectLst/>
-                        </a:rPr>
-                        <a:t>1</a:t>
-                      </a:r>
-                      <a:endParaRPr lang="es-AR" sz="1200" b="0" i="0" u="none" strike="noStrike" dirty="0">
-                        <a:solidFill>
-                          <a:srgbClr val="000000"/>
-                        </a:solidFill>
-                        <a:effectLst/>
-                        <a:latin typeface="Calibri"/>
-                      </a:endParaRPr>
-                    </a:p>
-                  </a:txBody>
-                  <a:tcPr marL="9525" marR="9525" marT="9525" marB="0" anchor="b"/>
-                </a:tc>
-              </a:tr>
-              <a:tr h="198672">
-                <a:tc vMerge="1">
-                  <a:txBody>
-                    <a:bodyPr/>
-                    <a:lstStyle/>
-                    <a:p>
-                      <a:endParaRPr lang="es-AR"/>
-                    </a:p>
-                  </a:txBody>
-                  <a:tcPr/>
-                </a:tc>
-                <a:tc>
-                  <a:txBody>
-                    <a:bodyPr/>
-                    <a:lstStyle/>
-                    <a:p>
-                      <a:pPr algn="ctr" fontAlgn="b"/>
-                      <a:r>
-                        <a:rPr lang="es-AR" sz="1200" u="none" strike="noStrike">
-                          <a:effectLst/>
-                        </a:rPr>
-                        <a:t>Redacción</a:t>
-                      </a:r>
-                      <a:endParaRPr lang="es-AR" sz="1200" b="0" i="0" u="none" strike="noStrike">
-                        <a:solidFill>
-                          <a:srgbClr val="000000"/>
-                        </a:solidFill>
-                        <a:effectLst/>
-                        <a:latin typeface="Calibri"/>
-                      </a:endParaRPr>
-                    </a:p>
-                  </a:txBody>
-                  <a:tcPr marL="9525" marR="9525" marT="9525" marB="0" anchor="b"/>
-                </a:tc>
-                <a:tc>
-                  <a:txBody>
-                    <a:bodyPr/>
-                    <a:lstStyle/>
-                    <a:p>
-                      <a:pPr algn="ctr" fontAlgn="b"/>
-                      <a:r>
-                        <a:rPr lang="es-AR" sz="1200" u="none" strike="noStrike">
-                          <a:effectLst/>
-                        </a:rPr>
-                        <a:t>Clase AC</a:t>
-                      </a:r>
-                      <a:endParaRPr lang="es-AR" sz="1200" b="0" i="0" u="none" strike="noStrike">
-                        <a:solidFill>
-                          <a:srgbClr val="000000"/>
-                        </a:solidFill>
-                        <a:effectLst/>
-                        <a:latin typeface="Calibri"/>
-                      </a:endParaRPr>
-                    </a:p>
-                  </a:txBody>
-                  <a:tcPr marL="9525" marR="9525" marT="9525" marB="0" anchor="b"/>
-                </a:tc>
-                <a:tc>
-                  <a:txBody>
-                    <a:bodyPr/>
-                    <a:lstStyle/>
-                    <a:p>
-                      <a:pPr algn="ctr" fontAlgn="b"/>
-                      <a:r>
-                        <a:rPr lang="es-AR" sz="1200" u="none" strike="noStrike" dirty="0">
-                          <a:effectLst/>
-                        </a:rPr>
-                        <a:t>1</a:t>
-                      </a:r>
-                      <a:endParaRPr lang="es-AR" sz="1200" b="0" i="0" u="none" strike="noStrike" dirty="0">
-                        <a:solidFill>
-                          <a:srgbClr val="000000"/>
-                        </a:solidFill>
-                        <a:effectLst/>
-                        <a:latin typeface="Calibri"/>
-                      </a:endParaRPr>
-                    </a:p>
-                  </a:txBody>
-                  <a:tcPr marL="9525" marR="9525" marT="9525" marB="0" anchor="b"/>
-                </a:tc>
-              </a:tr>
-              <a:tr h="198672">
-                <a:tc vMerge="1">
-                  <a:txBody>
-                    <a:bodyPr/>
-                    <a:lstStyle/>
-                    <a:p>
-                      <a:endParaRPr lang="es-AR"/>
-                    </a:p>
-                  </a:txBody>
-                  <a:tcPr/>
-                </a:tc>
-                <a:tc>
-                  <a:txBody>
-                    <a:bodyPr/>
-                    <a:lstStyle/>
-                    <a:p>
-                      <a:pPr algn="ctr" fontAlgn="b"/>
-                      <a:r>
-                        <a:rPr lang="es-AR" sz="1200" u="none" strike="noStrike">
-                          <a:effectLst/>
-                        </a:rPr>
-                        <a:t>kitchenette</a:t>
-                      </a:r>
-                      <a:endParaRPr lang="es-AR" sz="1200" b="0" i="0" u="none" strike="noStrike">
-                        <a:solidFill>
-                          <a:srgbClr val="000000"/>
-                        </a:solidFill>
-                        <a:effectLst/>
-                        <a:latin typeface="Calibri"/>
-                      </a:endParaRPr>
-                    </a:p>
-                  </a:txBody>
-                  <a:tcPr marL="9525" marR="9525" marT="9525" marB="0" anchor="b"/>
-                </a:tc>
-                <a:tc>
-                  <a:txBody>
-                    <a:bodyPr/>
-                    <a:lstStyle/>
-                    <a:p>
-                      <a:pPr algn="ctr" fontAlgn="b"/>
-                      <a:r>
-                        <a:rPr lang="es-AR" sz="1200" u="none" strike="noStrike">
-                          <a:effectLst/>
-                        </a:rPr>
-                        <a:t>Clase K</a:t>
-                      </a:r>
-                      <a:endParaRPr lang="es-AR" sz="1200" b="0" i="0" u="none" strike="noStrike">
-                        <a:solidFill>
-                          <a:srgbClr val="000000"/>
-                        </a:solidFill>
-                        <a:effectLst/>
-                        <a:latin typeface="Calibri"/>
-                      </a:endParaRPr>
-                    </a:p>
-                  </a:txBody>
-                  <a:tcPr marL="9525" marR="9525" marT="9525" marB="0" anchor="b"/>
-                </a:tc>
-                <a:tc>
-                  <a:txBody>
-                    <a:bodyPr/>
-                    <a:lstStyle/>
-                    <a:p>
-                      <a:pPr algn="ctr" fontAlgn="b"/>
-                      <a:r>
-                        <a:rPr lang="es-AR" sz="1200" u="none" strike="noStrike" dirty="0">
-                          <a:effectLst/>
-                        </a:rPr>
-                        <a:t>1</a:t>
-                      </a:r>
-                      <a:endParaRPr lang="es-AR" sz="1200" b="0" i="0" u="none" strike="noStrike" dirty="0">
-                        <a:solidFill>
-                          <a:srgbClr val="000000"/>
-                        </a:solidFill>
-                        <a:effectLst/>
-                        <a:latin typeface="Calibri"/>
-                      </a:endParaRPr>
-                    </a:p>
-                  </a:txBody>
-                  <a:tcPr marL="9525" marR="9525" marT="9525" marB="0" anchor="b"/>
-                </a:tc>
-              </a:tr>
-              <a:tr h="198672">
-                <a:tc rowSpan="4">
-                  <a:txBody>
-                    <a:bodyPr/>
-                    <a:lstStyle/>
-                    <a:p>
-                      <a:pPr algn="ctr" fontAlgn="ctr"/>
-                      <a:r>
-                        <a:rPr lang="es-AR" sz="1400" b="1" u="none" strike="noStrike" dirty="0">
-                          <a:effectLst/>
-                        </a:rPr>
-                        <a:t>Segundo Piso</a:t>
-                      </a:r>
-                      <a:endParaRPr lang="es-AR" sz="1400" b="1" i="0" u="none" strike="noStrike" dirty="0">
-                        <a:solidFill>
-                          <a:srgbClr val="000000"/>
-                        </a:solidFill>
-                        <a:effectLst/>
-                        <a:latin typeface="Calibri"/>
-                      </a:endParaRPr>
-                    </a:p>
-                  </a:txBody>
-                  <a:tcPr marL="9525" marR="9525" marT="9525" marB="0" anchor="ctr"/>
-                </a:tc>
-                <a:tc>
-                  <a:txBody>
-                    <a:bodyPr/>
-                    <a:lstStyle/>
-                    <a:p>
-                      <a:pPr algn="ctr" fontAlgn="b"/>
-                      <a:r>
-                        <a:rPr lang="es-AR" sz="1200" u="none" strike="noStrike">
-                          <a:effectLst/>
-                        </a:rPr>
-                        <a:t>Área Digital</a:t>
-                      </a:r>
-                      <a:endParaRPr lang="es-AR" sz="1200" b="0" i="0" u="none" strike="noStrike">
-                        <a:solidFill>
-                          <a:srgbClr val="000000"/>
-                        </a:solidFill>
-                        <a:effectLst/>
-                        <a:latin typeface="Calibri"/>
-                      </a:endParaRPr>
-                    </a:p>
-                  </a:txBody>
-                  <a:tcPr marL="9525" marR="9525" marT="9525" marB="0" anchor="b"/>
-                </a:tc>
-                <a:tc>
-                  <a:txBody>
-                    <a:bodyPr/>
-                    <a:lstStyle/>
-                    <a:p>
-                      <a:pPr algn="ctr" fontAlgn="b"/>
-                      <a:r>
-                        <a:rPr lang="es-AR" sz="1200" u="none" strike="noStrike">
-                          <a:effectLst/>
-                        </a:rPr>
-                        <a:t>Clase AC</a:t>
-                      </a:r>
-                      <a:endParaRPr lang="es-AR" sz="1200" b="0" i="0" u="none" strike="noStrike">
-                        <a:solidFill>
-                          <a:srgbClr val="000000"/>
-                        </a:solidFill>
-                        <a:effectLst/>
-                        <a:latin typeface="Calibri"/>
-                      </a:endParaRPr>
-                    </a:p>
-                  </a:txBody>
-                  <a:tcPr marL="9525" marR="9525" marT="9525" marB="0" anchor="b"/>
-                </a:tc>
-                <a:tc>
-                  <a:txBody>
-                    <a:bodyPr/>
-                    <a:lstStyle/>
-                    <a:p>
-                      <a:pPr algn="ctr" fontAlgn="b"/>
-                      <a:r>
-                        <a:rPr lang="es-AR" sz="1200" u="none" strike="noStrike" dirty="0">
-                          <a:effectLst/>
-                        </a:rPr>
-                        <a:t>2</a:t>
-                      </a:r>
-                      <a:endParaRPr lang="es-AR" sz="1200" b="0" i="0" u="none" strike="noStrike" dirty="0">
-                        <a:solidFill>
-                          <a:srgbClr val="000000"/>
-                        </a:solidFill>
-                        <a:effectLst/>
-                        <a:latin typeface="Calibri"/>
-                      </a:endParaRPr>
-                    </a:p>
-                  </a:txBody>
-                  <a:tcPr marL="9525" marR="9525" marT="9525" marB="0" anchor="b"/>
-                </a:tc>
-              </a:tr>
-              <a:tr h="198672">
-                <a:tc vMerge="1">
-                  <a:txBody>
-                    <a:bodyPr/>
-                    <a:lstStyle/>
-                    <a:p>
-                      <a:endParaRPr lang="es-AR"/>
-                    </a:p>
-                  </a:txBody>
-                  <a:tcPr/>
-                </a:tc>
-                <a:tc>
-                  <a:txBody>
-                    <a:bodyPr/>
-                    <a:lstStyle/>
-                    <a:p>
-                      <a:pPr algn="ctr" fontAlgn="b"/>
-                      <a:r>
-                        <a:rPr lang="es-AR" sz="1200" u="none" strike="noStrike">
-                          <a:effectLst/>
-                        </a:rPr>
-                        <a:t>Pasillo Sala y Oficinas</a:t>
-                      </a:r>
-                      <a:endParaRPr lang="es-AR" sz="1200" b="0" i="0" u="none" strike="noStrike">
-                        <a:solidFill>
-                          <a:srgbClr val="000000"/>
-                        </a:solidFill>
-                        <a:effectLst/>
-                        <a:latin typeface="Calibri"/>
-                      </a:endParaRPr>
-                    </a:p>
-                  </a:txBody>
-                  <a:tcPr marL="9525" marR="9525" marT="9525" marB="0" anchor="b"/>
-                </a:tc>
-                <a:tc>
-                  <a:txBody>
-                    <a:bodyPr/>
-                    <a:lstStyle/>
-                    <a:p>
-                      <a:pPr algn="ctr" fontAlgn="b"/>
-                      <a:r>
-                        <a:rPr lang="es-AR" sz="1200" u="none" strike="noStrike">
-                          <a:effectLst/>
-                        </a:rPr>
-                        <a:t>Clase AC</a:t>
-                      </a:r>
-                      <a:endParaRPr lang="es-AR" sz="1200" b="0" i="0" u="none" strike="noStrike">
-                        <a:solidFill>
-                          <a:srgbClr val="000000"/>
-                        </a:solidFill>
-                        <a:effectLst/>
-                        <a:latin typeface="Calibri"/>
-                      </a:endParaRPr>
-                    </a:p>
-                  </a:txBody>
-                  <a:tcPr marL="9525" marR="9525" marT="9525" marB="0" anchor="b"/>
-                </a:tc>
-                <a:tc>
-                  <a:txBody>
-                    <a:bodyPr/>
-                    <a:lstStyle/>
-                    <a:p>
-                      <a:pPr algn="ctr" fontAlgn="b"/>
-                      <a:r>
-                        <a:rPr lang="es-AR" sz="1200" u="none" strike="noStrike" dirty="0">
-                          <a:effectLst/>
-                        </a:rPr>
-                        <a:t>1</a:t>
-                      </a:r>
-                      <a:endParaRPr lang="es-AR" sz="1200" b="0" i="0" u="none" strike="noStrike" dirty="0">
-                        <a:solidFill>
-                          <a:srgbClr val="000000"/>
-                        </a:solidFill>
-                        <a:effectLst/>
-                        <a:latin typeface="Calibri"/>
-                      </a:endParaRPr>
-                    </a:p>
-                  </a:txBody>
-                  <a:tcPr marL="9525" marR="9525" marT="9525" marB="0" anchor="b"/>
-                </a:tc>
-              </a:tr>
-              <a:tr h="198672">
-                <a:tc vMerge="1">
-                  <a:txBody>
-                    <a:bodyPr/>
-                    <a:lstStyle/>
-                    <a:p>
-                      <a:endParaRPr lang="es-AR"/>
-                    </a:p>
-                  </a:txBody>
-                  <a:tcPr/>
-                </a:tc>
-                <a:tc>
-                  <a:txBody>
-                    <a:bodyPr/>
-                    <a:lstStyle/>
-                    <a:p>
-                      <a:pPr algn="ctr" fontAlgn="b"/>
-                      <a:r>
-                        <a:rPr lang="es-AR" sz="1200" u="none" strike="noStrike">
-                          <a:effectLst/>
-                        </a:rPr>
-                        <a:t>kitchenette</a:t>
-                      </a:r>
-                      <a:endParaRPr lang="es-AR" sz="1200" b="0" i="0" u="none" strike="noStrike">
-                        <a:solidFill>
-                          <a:srgbClr val="000000"/>
-                        </a:solidFill>
-                        <a:effectLst/>
-                        <a:latin typeface="Calibri"/>
-                      </a:endParaRPr>
-                    </a:p>
-                  </a:txBody>
-                  <a:tcPr marL="9525" marR="9525" marT="9525" marB="0" anchor="b"/>
-                </a:tc>
-                <a:tc>
-                  <a:txBody>
-                    <a:bodyPr/>
-                    <a:lstStyle/>
-                    <a:p>
-                      <a:pPr algn="ctr" fontAlgn="b"/>
-                      <a:r>
-                        <a:rPr lang="es-AR" sz="1200" u="none" strike="noStrike">
-                          <a:effectLst/>
-                        </a:rPr>
-                        <a:t>Clase K</a:t>
-                      </a:r>
-                      <a:endParaRPr lang="es-AR" sz="1200" b="0" i="0" u="none" strike="noStrike">
-                        <a:solidFill>
-                          <a:srgbClr val="000000"/>
-                        </a:solidFill>
-                        <a:effectLst/>
-                        <a:latin typeface="Calibri"/>
-                      </a:endParaRPr>
-                    </a:p>
-                  </a:txBody>
-                  <a:tcPr marL="9525" marR="9525" marT="9525" marB="0" anchor="b"/>
-                </a:tc>
-                <a:tc>
-                  <a:txBody>
-                    <a:bodyPr/>
-                    <a:lstStyle/>
-                    <a:p>
-                      <a:pPr algn="ctr" fontAlgn="b"/>
-                      <a:r>
-                        <a:rPr lang="es-AR" sz="1200" u="none" strike="noStrike" dirty="0">
-                          <a:effectLst/>
-                        </a:rPr>
-                        <a:t>1</a:t>
-                      </a:r>
-                      <a:endParaRPr lang="es-AR" sz="1200" b="0" i="0" u="none" strike="noStrike" dirty="0">
-                        <a:solidFill>
-                          <a:srgbClr val="000000"/>
-                        </a:solidFill>
-                        <a:effectLst/>
-                        <a:latin typeface="Calibri"/>
-                      </a:endParaRPr>
-                    </a:p>
-                  </a:txBody>
-                  <a:tcPr marL="9525" marR="9525" marT="9525" marB="0" anchor="b"/>
-                </a:tc>
-              </a:tr>
-              <a:tr h="198672">
-                <a:tc vMerge="1">
-                  <a:txBody>
-                    <a:bodyPr/>
-                    <a:lstStyle/>
-                    <a:p>
-                      <a:endParaRPr lang="es-AR"/>
-                    </a:p>
-                  </a:txBody>
-                  <a:tcPr/>
-                </a:tc>
-                <a:tc>
-                  <a:txBody>
-                    <a:bodyPr/>
-                    <a:lstStyle/>
-                    <a:p>
-                      <a:pPr algn="ctr" fontAlgn="b"/>
-                      <a:r>
-                        <a:rPr lang="es-AR" sz="1200" u="none" strike="noStrike">
-                          <a:effectLst/>
-                        </a:rPr>
-                        <a:t>Escaleras</a:t>
-                      </a:r>
-                      <a:endParaRPr lang="es-AR" sz="1200" b="0" i="0" u="none" strike="noStrike">
-                        <a:solidFill>
-                          <a:srgbClr val="000000"/>
-                        </a:solidFill>
-                        <a:effectLst/>
-                        <a:latin typeface="Calibri"/>
-                      </a:endParaRPr>
-                    </a:p>
-                  </a:txBody>
-                  <a:tcPr marL="9525" marR="9525" marT="9525" marB="0" anchor="b"/>
-                </a:tc>
-                <a:tc>
-                  <a:txBody>
-                    <a:bodyPr/>
-                    <a:lstStyle/>
-                    <a:p>
-                      <a:pPr algn="ctr" fontAlgn="b"/>
-                      <a:r>
-                        <a:rPr lang="es-AR" sz="1200" u="none" strike="noStrike">
-                          <a:effectLst/>
-                        </a:rPr>
-                        <a:t>Clase AC</a:t>
-                      </a:r>
-                      <a:endParaRPr lang="es-AR" sz="1200" b="0" i="0" u="none" strike="noStrike">
-                        <a:solidFill>
-                          <a:srgbClr val="000000"/>
-                        </a:solidFill>
-                        <a:effectLst/>
-                        <a:latin typeface="Calibri"/>
-                      </a:endParaRPr>
-                    </a:p>
-                  </a:txBody>
-                  <a:tcPr marL="9525" marR="9525" marT="9525" marB="0" anchor="b"/>
-                </a:tc>
-                <a:tc>
-                  <a:txBody>
-                    <a:bodyPr/>
-                    <a:lstStyle/>
-                    <a:p>
-                      <a:pPr algn="ctr" fontAlgn="b"/>
-                      <a:r>
-                        <a:rPr lang="es-AR" sz="1200" u="none" strike="noStrike" dirty="0">
-                          <a:effectLst/>
-                        </a:rPr>
-                        <a:t>1</a:t>
-                      </a:r>
-                      <a:endParaRPr lang="es-AR" sz="1200" b="0" i="0" u="none" strike="noStrike" dirty="0">
-                        <a:solidFill>
-                          <a:srgbClr val="000000"/>
-                        </a:solidFill>
-                        <a:effectLst/>
-                        <a:latin typeface="Calibri"/>
-                      </a:endParaRPr>
-                    </a:p>
-                  </a:txBody>
-                  <a:tcPr marL="9525" marR="9525" marT="9525" marB="0" anchor="b"/>
-                </a:tc>
-              </a:tr>
-              <a:tr h="198672">
-                <a:tc rowSpan="3">
-                  <a:txBody>
-                    <a:bodyPr/>
-                    <a:lstStyle/>
-                    <a:p>
-                      <a:pPr algn="ctr" fontAlgn="ctr"/>
-                      <a:r>
-                        <a:rPr lang="es-AR" sz="1400" b="1" u="none" strike="noStrike" dirty="0">
-                          <a:effectLst/>
-                        </a:rPr>
-                        <a:t>Tercer Piso</a:t>
-                      </a:r>
-                      <a:endParaRPr lang="es-AR" sz="1400" b="1" i="0" u="none" strike="noStrike" dirty="0">
-                        <a:solidFill>
-                          <a:srgbClr val="000000"/>
-                        </a:solidFill>
-                        <a:effectLst/>
-                        <a:latin typeface="Calibri"/>
-                      </a:endParaRPr>
-                    </a:p>
-                  </a:txBody>
-                  <a:tcPr marL="9525" marR="9525" marT="9525" marB="0" anchor="ctr"/>
-                </a:tc>
-                <a:tc>
-                  <a:txBody>
-                    <a:bodyPr/>
-                    <a:lstStyle/>
-                    <a:p>
-                      <a:pPr algn="ctr" fontAlgn="b"/>
-                      <a:r>
-                        <a:rPr lang="es-AR" sz="1200" u="none" strike="noStrike">
-                          <a:effectLst/>
-                        </a:rPr>
-                        <a:t>Capacitación</a:t>
-                      </a:r>
-                      <a:endParaRPr lang="es-AR" sz="1200" b="0" i="0" u="none" strike="noStrike">
-                        <a:solidFill>
-                          <a:srgbClr val="000000"/>
-                        </a:solidFill>
-                        <a:effectLst/>
-                        <a:latin typeface="Calibri"/>
-                      </a:endParaRPr>
-                    </a:p>
-                  </a:txBody>
-                  <a:tcPr marL="9525" marR="9525" marT="9525" marB="0" anchor="b"/>
-                </a:tc>
-                <a:tc>
-                  <a:txBody>
-                    <a:bodyPr/>
-                    <a:lstStyle/>
-                    <a:p>
-                      <a:pPr algn="ctr" fontAlgn="b"/>
-                      <a:r>
-                        <a:rPr lang="es-AR" sz="1200" u="none" strike="noStrike">
-                          <a:effectLst/>
-                        </a:rPr>
-                        <a:t>Clase AC</a:t>
-                      </a:r>
-                      <a:endParaRPr lang="es-AR" sz="1200" b="0" i="0" u="none" strike="noStrike">
-                        <a:solidFill>
-                          <a:srgbClr val="000000"/>
-                        </a:solidFill>
-                        <a:effectLst/>
-                        <a:latin typeface="Calibri"/>
-                      </a:endParaRPr>
-                    </a:p>
-                  </a:txBody>
-                  <a:tcPr marL="9525" marR="9525" marT="9525" marB="0" anchor="b"/>
-                </a:tc>
-                <a:tc>
-                  <a:txBody>
-                    <a:bodyPr/>
-                    <a:lstStyle/>
-                    <a:p>
-                      <a:pPr algn="ctr" fontAlgn="b"/>
-                      <a:r>
-                        <a:rPr lang="es-AR" sz="1200" u="none" strike="noStrike" dirty="0">
-                          <a:effectLst/>
-                        </a:rPr>
-                        <a:t>2</a:t>
-                      </a:r>
-                      <a:endParaRPr lang="es-AR" sz="1200" b="0" i="0" u="none" strike="noStrike" dirty="0">
-                        <a:solidFill>
-                          <a:srgbClr val="000000"/>
-                        </a:solidFill>
-                        <a:effectLst/>
-                        <a:latin typeface="Calibri"/>
-                      </a:endParaRPr>
-                    </a:p>
-                  </a:txBody>
-                  <a:tcPr marL="9525" marR="9525" marT="9525" marB="0" anchor="b"/>
-                </a:tc>
-              </a:tr>
-              <a:tr h="198672">
-                <a:tc vMerge="1">
-                  <a:txBody>
-                    <a:bodyPr/>
-                    <a:lstStyle/>
-                    <a:p>
-                      <a:endParaRPr lang="es-AR"/>
-                    </a:p>
-                  </a:txBody>
-                  <a:tcPr/>
-                </a:tc>
-                <a:tc>
-                  <a:txBody>
-                    <a:bodyPr/>
-                    <a:lstStyle/>
-                    <a:p>
-                      <a:pPr algn="ctr" fontAlgn="b"/>
-                      <a:r>
-                        <a:rPr lang="es-AR" sz="1200" u="none" strike="noStrike">
-                          <a:effectLst/>
-                        </a:rPr>
-                        <a:t>Entrevistas</a:t>
-                      </a:r>
-                      <a:endParaRPr lang="es-AR" sz="1200" b="0" i="0" u="none" strike="noStrike">
-                        <a:solidFill>
-                          <a:srgbClr val="000000"/>
-                        </a:solidFill>
-                        <a:effectLst/>
-                        <a:latin typeface="Calibri"/>
-                      </a:endParaRPr>
-                    </a:p>
-                  </a:txBody>
-                  <a:tcPr marL="9525" marR="9525" marT="9525" marB="0" anchor="b"/>
-                </a:tc>
-                <a:tc>
-                  <a:txBody>
-                    <a:bodyPr/>
-                    <a:lstStyle/>
-                    <a:p>
-                      <a:pPr algn="ctr" fontAlgn="b"/>
-                      <a:r>
-                        <a:rPr lang="es-AR" sz="1200" u="none" strike="noStrike">
-                          <a:effectLst/>
-                        </a:rPr>
-                        <a:t>Clase AC</a:t>
-                      </a:r>
-                      <a:endParaRPr lang="es-AR" sz="1200" b="0" i="0" u="none" strike="noStrike">
-                        <a:solidFill>
-                          <a:srgbClr val="000000"/>
-                        </a:solidFill>
-                        <a:effectLst/>
-                        <a:latin typeface="Calibri"/>
-                      </a:endParaRPr>
-                    </a:p>
-                  </a:txBody>
-                  <a:tcPr marL="9525" marR="9525" marT="9525" marB="0" anchor="b"/>
-                </a:tc>
-                <a:tc>
-                  <a:txBody>
-                    <a:bodyPr/>
-                    <a:lstStyle/>
-                    <a:p>
-                      <a:pPr algn="ctr" fontAlgn="b"/>
-                      <a:r>
-                        <a:rPr lang="es-AR" sz="1200" u="none" strike="noStrike" dirty="0">
-                          <a:effectLst/>
-                        </a:rPr>
-                        <a:t>1</a:t>
-                      </a:r>
-                      <a:endParaRPr lang="es-AR" sz="1200" b="0" i="0" u="none" strike="noStrike" dirty="0">
-                        <a:solidFill>
-                          <a:srgbClr val="000000"/>
-                        </a:solidFill>
-                        <a:effectLst/>
-                        <a:latin typeface="Calibri"/>
-                      </a:endParaRPr>
-                    </a:p>
-                  </a:txBody>
-                  <a:tcPr marL="9525" marR="9525" marT="9525" marB="0" anchor="b"/>
-                </a:tc>
-              </a:tr>
-              <a:tr h="198672">
-                <a:tc vMerge="1">
-                  <a:txBody>
-                    <a:bodyPr/>
-                    <a:lstStyle/>
-                    <a:p>
-                      <a:endParaRPr lang="es-AR"/>
-                    </a:p>
-                  </a:txBody>
-                  <a:tcPr/>
-                </a:tc>
-                <a:tc>
-                  <a:txBody>
-                    <a:bodyPr/>
-                    <a:lstStyle/>
-                    <a:p>
-                      <a:pPr algn="ctr" fontAlgn="b"/>
-                      <a:r>
-                        <a:rPr lang="es-AR" sz="1200" u="none" strike="noStrike">
-                          <a:effectLst/>
-                        </a:rPr>
-                        <a:t>kitchenette</a:t>
-                      </a:r>
-                      <a:endParaRPr lang="es-AR" sz="1200" b="0" i="0" u="none" strike="noStrike">
-                        <a:solidFill>
-                          <a:srgbClr val="000000"/>
-                        </a:solidFill>
-                        <a:effectLst/>
-                        <a:latin typeface="Calibri"/>
-                      </a:endParaRPr>
-                    </a:p>
-                  </a:txBody>
-                  <a:tcPr marL="9525" marR="9525" marT="9525" marB="0" anchor="b"/>
-                </a:tc>
-                <a:tc>
-                  <a:txBody>
-                    <a:bodyPr/>
-                    <a:lstStyle/>
-                    <a:p>
-                      <a:pPr algn="ctr" fontAlgn="b"/>
-                      <a:r>
-                        <a:rPr lang="es-AR" sz="1200" u="none" strike="noStrike">
-                          <a:effectLst/>
-                        </a:rPr>
-                        <a:t>Clase K</a:t>
-                      </a:r>
-                      <a:endParaRPr lang="es-AR" sz="1200" b="0" i="0" u="none" strike="noStrike">
-                        <a:solidFill>
-                          <a:srgbClr val="000000"/>
-                        </a:solidFill>
-                        <a:effectLst/>
-                        <a:latin typeface="Calibri"/>
-                      </a:endParaRPr>
-                    </a:p>
-                  </a:txBody>
-                  <a:tcPr marL="9525" marR="9525" marT="9525" marB="0" anchor="b"/>
-                </a:tc>
-                <a:tc>
-                  <a:txBody>
-                    <a:bodyPr/>
-                    <a:lstStyle/>
-                    <a:p>
-                      <a:pPr algn="ctr" fontAlgn="b"/>
-                      <a:r>
-                        <a:rPr lang="es-AR" sz="1200" u="none" strike="noStrike" dirty="0">
-                          <a:effectLst/>
-                        </a:rPr>
-                        <a:t>1</a:t>
-                      </a:r>
-                      <a:endParaRPr lang="es-AR" sz="1200" b="0" i="0" u="none" strike="noStrike" dirty="0">
-                        <a:solidFill>
-                          <a:srgbClr val="000000"/>
-                        </a:solidFill>
-                        <a:effectLst/>
-                        <a:latin typeface="Calibri"/>
-                      </a:endParaRPr>
-                    </a:p>
-                  </a:txBody>
-                  <a:tcPr marL="9525" marR="9525" marT="9525" marB="0" anchor="b"/>
-                </a:tc>
-              </a:tr>
-              <a:tr h="198672">
-                <a:tc rowSpan="3">
-                  <a:txBody>
-                    <a:bodyPr/>
-                    <a:lstStyle/>
-                    <a:p>
-                      <a:pPr algn="ctr" fontAlgn="ctr"/>
-                      <a:r>
-                        <a:rPr lang="es-AR" sz="1400" b="1" u="none" strike="noStrike" dirty="0">
-                          <a:effectLst/>
-                        </a:rPr>
-                        <a:t>Cuarto Piso</a:t>
-                      </a:r>
-                      <a:endParaRPr lang="es-AR" sz="1400" b="1" i="0" u="none" strike="noStrike" dirty="0">
-                        <a:solidFill>
-                          <a:srgbClr val="000000"/>
-                        </a:solidFill>
-                        <a:effectLst/>
-                        <a:latin typeface="Calibri"/>
-                      </a:endParaRPr>
-                    </a:p>
-                  </a:txBody>
-                  <a:tcPr marL="9525" marR="9525" marT="9525" marB="0" anchor="ctr"/>
-                </a:tc>
-                <a:tc>
-                  <a:txBody>
-                    <a:bodyPr/>
-                    <a:lstStyle/>
-                    <a:p>
-                      <a:pPr algn="ctr" fontAlgn="b"/>
-                      <a:r>
-                        <a:rPr lang="es-AR" sz="1200" u="none" strike="noStrike">
-                          <a:effectLst/>
-                        </a:rPr>
-                        <a:t>Sistemas</a:t>
-                      </a:r>
-                      <a:endParaRPr lang="es-AR" sz="1200" b="0" i="0" u="none" strike="noStrike">
-                        <a:solidFill>
-                          <a:srgbClr val="000000"/>
-                        </a:solidFill>
-                        <a:effectLst/>
-                        <a:latin typeface="Calibri"/>
-                      </a:endParaRPr>
-                    </a:p>
-                  </a:txBody>
-                  <a:tcPr marL="9525" marR="9525" marT="9525" marB="0" anchor="b"/>
-                </a:tc>
-                <a:tc>
-                  <a:txBody>
-                    <a:bodyPr/>
-                    <a:lstStyle/>
-                    <a:p>
-                      <a:pPr algn="ctr" fontAlgn="b"/>
-                      <a:r>
-                        <a:rPr lang="es-AR" sz="1200" u="none" strike="noStrike">
-                          <a:effectLst/>
-                        </a:rPr>
-                        <a:t>Clase AC</a:t>
-                      </a:r>
-                      <a:endParaRPr lang="es-AR" sz="1200" b="0" i="0" u="none" strike="noStrike">
-                        <a:solidFill>
-                          <a:srgbClr val="000000"/>
-                        </a:solidFill>
-                        <a:effectLst/>
-                        <a:latin typeface="Calibri"/>
-                      </a:endParaRPr>
-                    </a:p>
-                  </a:txBody>
-                  <a:tcPr marL="9525" marR="9525" marT="9525" marB="0" anchor="b"/>
-                </a:tc>
-                <a:tc>
-                  <a:txBody>
-                    <a:bodyPr/>
-                    <a:lstStyle/>
-                    <a:p>
-                      <a:pPr algn="ctr" fontAlgn="b"/>
-                      <a:r>
-                        <a:rPr lang="es-AR" sz="1200" u="none" strike="noStrike" dirty="0">
-                          <a:effectLst/>
-                        </a:rPr>
-                        <a:t>1</a:t>
-                      </a:r>
-                      <a:endParaRPr lang="es-AR" sz="1200" b="0" i="0" u="none" strike="noStrike" dirty="0">
-                        <a:solidFill>
-                          <a:srgbClr val="000000"/>
-                        </a:solidFill>
-                        <a:effectLst/>
-                        <a:latin typeface="Calibri"/>
-                      </a:endParaRPr>
-                    </a:p>
-                  </a:txBody>
-                  <a:tcPr marL="9525" marR="9525" marT="9525" marB="0" anchor="b"/>
-                </a:tc>
-              </a:tr>
-              <a:tr h="198672">
-                <a:tc vMerge="1">
-                  <a:txBody>
-                    <a:bodyPr/>
-                    <a:lstStyle/>
-                    <a:p>
-                      <a:endParaRPr lang="es-AR"/>
-                    </a:p>
-                  </a:txBody>
-                  <a:tcPr/>
-                </a:tc>
-                <a:tc>
-                  <a:txBody>
-                    <a:bodyPr/>
-                    <a:lstStyle/>
-                    <a:p>
-                      <a:pPr algn="ctr" fontAlgn="b"/>
-                      <a:r>
-                        <a:rPr lang="es-AR" sz="1200" u="none" strike="noStrike">
-                          <a:effectLst/>
-                        </a:rPr>
-                        <a:t>kitchenette</a:t>
-                      </a:r>
-                      <a:endParaRPr lang="es-AR" sz="1200" b="0" i="0" u="none" strike="noStrike">
-                        <a:solidFill>
-                          <a:srgbClr val="000000"/>
-                        </a:solidFill>
-                        <a:effectLst/>
-                        <a:latin typeface="Calibri"/>
-                      </a:endParaRPr>
-                    </a:p>
-                  </a:txBody>
-                  <a:tcPr marL="9525" marR="9525" marT="9525" marB="0" anchor="b"/>
-                </a:tc>
-                <a:tc>
-                  <a:txBody>
-                    <a:bodyPr/>
-                    <a:lstStyle/>
-                    <a:p>
-                      <a:pPr algn="ctr" fontAlgn="b"/>
-                      <a:r>
-                        <a:rPr lang="es-AR" sz="1200" u="none" strike="noStrike">
-                          <a:effectLst/>
-                        </a:rPr>
-                        <a:t>Clase K</a:t>
-                      </a:r>
-                      <a:endParaRPr lang="es-AR" sz="1200" b="0" i="0" u="none" strike="noStrike">
-                        <a:solidFill>
-                          <a:srgbClr val="000000"/>
-                        </a:solidFill>
-                        <a:effectLst/>
-                        <a:latin typeface="Calibri"/>
-                      </a:endParaRPr>
-                    </a:p>
-                  </a:txBody>
-                  <a:tcPr marL="9525" marR="9525" marT="9525" marB="0" anchor="b"/>
-                </a:tc>
-                <a:tc>
-                  <a:txBody>
-                    <a:bodyPr/>
-                    <a:lstStyle/>
-                    <a:p>
-                      <a:pPr algn="ctr" fontAlgn="b"/>
-                      <a:r>
-                        <a:rPr lang="es-AR" sz="1200" u="none" strike="noStrike" dirty="0">
-                          <a:effectLst/>
-                        </a:rPr>
-                        <a:t>1</a:t>
-                      </a:r>
-                      <a:endParaRPr lang="es-AR" sz="1200" b="0" i="0" u="none" strike="noStrike" dirty="0">
-                        <a:solidFill>
-                          <a:srgbClr val="000000"/>
-                        </a:solidFill>
-                        <a:effectLst/>
-                        <a:latin typeface="Calibri"/>
-                      </a:endParaRPr>
-                    </a:p>
-                  </a:txBody>
-                  <a:tcPr marL="9525" marR="9525" marT="9525" marB="0" anchor="b"/>
-                </a:tc>
-              </a:tr>
-              <a:tr h="198672">
-                <a:tc vMerge="1">
-                  <a:txBody>
-                    <a:bodyPr/>
-                    <a:lstStyle/>
-                    <a:p>
-                      <a:endParaRPr lang="es-AR"/>
-                    </a:p>
-                  </a:txBody>
-                  <a:tcPr/>
-                </a:tc>
-                <a:tc>
-                  <a:txBody>
-                    <a:bodyPr/>
-                    <a:lstStyle/>
-                    <a:p>
-                      <a:pPr algn="ctr" fontAlgn="b"/>
-                      <a:r>
-                        <a:rPr lang="es-AR" sz="1200" u="none" strike="noStrike">
-                          <a:effectLst/>
-                        </a:rPr>
-                        <a:t>Escaleras</a:t>
-                      </a:r>
-                      <a:endParaRPr lang="es-AR" sz="1200" b="0" i="0" u="none" strike="noStrike">
-                        <a:solidFill>
-                          <a:srgbClr val="000000"/>
-                        </a:solidFill>
-                        <a:effectLst/>
-                        <a:latin typeface="Calibri"/>
-                      </a:endParaRPr>
-                    </a:p>
-                  </a:txBody>
-                  <a:tcPr marL="9525" marR="9525" marT="9525" marB="0" anchor="b"/>
-                </a:tc>
-                <a:tc>
-                  <a:txBody>
-                    <a:bodyPr/>
-                    <a:lstStyle/>
-                    <a:p>
-                      <a:pPr algn="ctr" fontAlgn="b"/>
-                      <a:r>
-                        <a:rPr lang="es-AR" sz="1200" u="none" strike="noStrike">
-                          <a:effectLst/>
-                        </a:rPr>
-                        <a:t>Clase AC</a:t>
-                      </a:r>
-                      <a:endParaRPr lang="es-AR" sz="1200" b="0" i="0" u="none" strike="noStrike">
-                        <a:solidFill>
-                          <a:srgbClr val="000000"/>
-                        </a:solidFill>
-                        <a:effectLst/>
-                        <a:latin typeface="Calibri"/>
-                      </a:endParaRPr>
-                    </a:p>
-                  </a:txBody>
-                  <a:tcPr marL="9525" marR="9525" marT="9525" marB="0" anchor="b"/>
-                </a:tc>
-                <a:tc>
-                  <a:txBody>
-                    <a:bodyPr/>
-                    <a:lstStyle/>
-                    <a:p>
-                      <a:pPr algn="ctr" fontAlgn="b"/>
-                      <a:r>
-                        <a:rPr lang="es-AR" sz="1200" u="none" strike="noStrike" dirty="0">
-                          <a:effectLst/>
-                        </a:rPr>
-                        <a:t>1</a:t>
-                      </a:r>
-                      <a:endParaRPr lang="es-AR" sz="1200" b="0" i="0" u="none" strike="noStrike" dirty="0">
-                        <a:solidFill>
-                          <a:srgbClr val="000000"/>
-                        </a:solidFill>
-                        <a:effectLst/>
-                        <a:latin typeface="Calibri"/>
-                      </a:endParaRPr>
-                    </a:p>
-                  </a:txBody>
-                  <a:tcPr marL="9525" marR="9525" marT="9525" marB="0" anchor="b"/>
-                </a:tc>
-              </a:tr>
-              <a:tr h="198672">
-                <a:tc rowSpan="3">
-                  <a:txBody>
-                    <a:bodyPr/>
-                    <a:lstStyle/>
-                    <a:p>
-                      <a:pPr algn="ctr" fontAlgn="ctr"/>
-                      <a:r>
-                        <a:rPr lang="es-AR" sz="1400" b="1" u="none" strike="noStrike" dirty="0">
-                          <a:effectLst/>
-                        </a:rPr>
-                        <a:t>Quinto Piso</a:t>
-                      </a:r>
-                      <a:endParaRPr lang="es-AR" sz="1400" b="1" i="0" u="none" strike="noStrike" dirty="0">
-                        <a:solidFill>
-                          <a:srgbClr val="000000"/>
-                        </a:solidFill>
-                        <a:effectLst/>
-                        <a:latin typeface="Calibri"/>
-                      </a:endParaRPr>
-                    </a:p>
-                  </a:txBody>
-                  <a:tcPr marL="9525" marR="9525" marT="9525" marB="0" anchor="ctr"/>
-                </a:tc>
-                <a:tc>
-                  <a:txBody>
-                    <a:bodyPr/>
-                    <a:lstStyle/>
-                    <a:p>
-                      <a:pPr algn="ctr" fontAlgn="b"/>
-                      <a:r>
-                        <a:rPr lang="es-AR" sz="1200" u="none" strike="noStrike">
-                          <a:effectLst/>
-                        </a:rPr>
-                        <a:t>Gerencia General</a:t>
-                      </a:r>
-                      <a:endParaRPr lang="es-AR" sz="1200" b="0" i="0" u="none" strike="noStrike">
-                        <a:solidFill>
-                          <a:srgbClr val="000000"/>
-                        </a:solidFill>
-                        <a:effectLst/>
-                        <a:latin typeface="Calibri"/>
-                      </a:endParaRPr>
-                    </a:p>
-                  </a:txBody>
-                  <a:tcPr marL="9525" marR="9525" marT="9525" marB="0" anchor="b"/>
-                </a:tc>
-                <a:tc>
-                  <a:txBody>
-                    <a:bodyPr/>
-                    <a:lstStyle/>
-                    <a:p>
-                      <a:pPr algn="ctr" fontAlgn="b"/>
-                      <a:r>
-                        <a:rPr lang="es-AR" sz="1200" u="none" strike="noStrike">
-                          <a:effectLst/>
-                        </a:rPr>
-                        <a:t>Clase AC</a:t>
-                      </a:r>
-                      <a:endParaRPr lang="es-AR" sz="1200" b="0" i="0" u="none" strike="noStrike">
-                        <a:solidFill>
-                          <a:srgbClr val="000000"/>
-                        </a:solidFill>
-                        <a:effectLst/>
-                        <a:latin typeface="Calibri"/>
-                      </a:endParaRPr>
-                    </a:p>
-                  </a:txBody>
-                  <a:tcPr marL="9525" marR="9525" marT="9525" marB="0" anchor="b"/>
-                </a:tc>
-                <a:tc>
-                  <a:txBody>
-                    <a:bodyPr/>
-                    <a:lstStyle/>
-                    <a:p>
-                      <a:pPr algn="ctr" fontAlgn="b"/>
-                      <a:r>
-                        <a:rPr lang="es-AR" sz="1200" u="none" strike="noStrike" dirty="0">
-                          <a:effectLst/>
-                        </a:rPr>
-                        <a:t>1</a:t>
-                      </a:r>
-                      <a:endParaRPr lang="es-AR" sz="1200" b="0" i="0" u="none" strike="noStrike" dirty="0">
-                        <a:solidFill>
-                          <a:srgbClr val="000000"/>
-                        </a:solidFill>
-                        <a:effectLst/>
-                        <a:latin typeface="Calibri"/>
-                      </a:endParaRPr>
-                    </a:p>
-                  </a:txBody>
-                  <a:tcPr marL="9525" marR="9525" marT="9525" marB="0" anchor="b"/>
-                </a:tc>
-              </a:tr>
-              <a:tr h="198672">
-                <a:tc vMerge="1">
-                  <a:txBody>
-                    <a:bodyPr/>
-                    <a:lstStyle/>
-                    <a:p>
-                      <a:endParaRPr lang="es-AR"/>
-                    </a:p>
-                  </a:txBody>
-                  <a:tcPr/>
-                </a:tc>
-                <a:tc>
-                  <a:txBody>
-                    <a:bodyPr/>
-                    <a:lstStyle/>
-                    <a:p>
-                      <a:pPr algn="ctr" fontAlgn="b"/>
-                      <a:r>
-                        <a:rPr lang="es-AR" sz="1200" u="none" strike="noStrike">
-                          <a:effectLst/>
-                        </a:rPr>
-                        <a:t>kitchenette</a:t>
-                      </a:r>
-                      <a:endParaRPr lang="es-AR" sz="1200" b="0" i="0" u="none" strike="noStrike">
-                        <a:solidFill>
-                          <a:srgbClr val="000000"/>
-                        </a:solidFill>
-                        <a:effectLst/>
-                        <a:latin typeface="Calibri"/>
-                      </a:endParaRPr>
-                    </a:p>
-                  </a:txBody>
-                  <a:tcPr marL="9525" marR="9525" marT="9525" marB="0" anchor="b"/>
-                </a:tc>
-                <a:tc>
-                  <a:txBody>
-                    <a:bodyPr/>
-                    <a:lstStyle/>
-                    <a:p>
-                      <a:pPr algn="ctr" fontAlgn="b"/>
-                      <a:r>
-                        <a:rPr lang="es-AR" sz="1200" u="none" strike="noStrike">
-                          <a:effectLst/>
-                        </a:rPr>
-                        <a:t>Clase K</a:t>
-                      </a:r>
-                      <a:endParaRPr lang="es-AR" sz="1200" b="0" i="0" u="none" strike="noStrike">
-                        <a:solidFill>
-                          <a:srgbClr val="000000"/>
-                        </a:solidFill>
-                        <a:effectLst/>
-                        <a:latin typeface="Calibri"/>
-                      </a:endParaRPr>
-                    </a:p>
-                  </a:txBody>
-                  <a:tcPr marL="9525" marR="9525" marT="9525" marB="0" anchor="b"/>
-                </a:tc>
-                <a:tc>
-                  <a:txBody>
-                    <a:bodyPr/>
-                    <a:lstStyle/>
-                    <a:p>
-                      <a:pPr algn="ctr" fontAlgn="b"/>
-                      <a:r>
-                        <a:rPr lang="es-AR" sz="1200" u="none" strike="noStrike" dirty="0">
-                          <a:effectLst/>
-                        </a:rPr>
-                        <a:t>1</a:t>
-                      </a:r>
-                      <a:endParaRPr lang="es-AR" sz="1200" b="0" i="0" u="none" strike="noStrike" dirty="0">
-                        <a:solidFill>
-                          <a:srgbClr val="000000"/>
-                        </a:solidFill>
-                        <a:effectLst/>
-                        <a:latin typeface="Calibri"/>
-                      </a:endParaRPr>
-                    </a:p>
-                  </a:txBody>
-                  <a:tcPr marL="9525" marR="9525" marT="9525" marB="0" anchor="b"/>
-                </a:tc>
-              </a:tr>
-              <a:tr h="196705">
-                <a:tc vMerge="1">
-                  <a:txBody>
-                    <a:bodyPr/>
-                    <a:lstStyle/>
-                    <a:p>
-                      <a:endParaRPr lang="es-AR"/>
-                    </a:p>
-                  </a:txBody>
-                  <a:tcPr/>
-                </a:tc>
-                <a:tc>
-                  <a:txBody>
-                    <a:bodyPr/>
-                    <a:lstStyle/>
-                    <a:p>
-                      <a:pPr algn="ctr" fontAlgn="b"/>
-                      <a:r>
-                        <a:rPr lang="es-AR" sz="1100" u="none" strike="noStrike">
-                          <a:effectLst/>
-                        </a:rPr>
-                        <a:t>Sala de Reuniones</a:t>
-                      </a:r>
-                      <a:endParaRPr lang="es-AR" sz="1100" b="0" i="0" u="none" strike="noStrike">
-                        <a:solidFill>
-                          <a:srgbClr val="000000"/>
-                        </a:solidFill>
-                        <a:effectLst/>
-                        <a:latin typeface="Calibri"/>
-                      </a:endParaRPr>
-                    </a:p>
-                  </a:txBody>
-                  <a:tcPr marL="9525" marR="9525" marT="9525" marB="0" anchor="b"/>
-                </a:tc>
-                <a:tc>
-                  <a:txBody>
-                    <a:bodyPr/>
-                    <a:lstStyle/>
-                    <a:p>
-                      <a:pPr algn="ctr" fontAlgn="b"/>
-                      <a:r>
-                        <a:rPr lang="es-AR" sz="1100" u="none" strike="noStrike">
-                          <a:effectLst/>
-                        </a:rPr>
-                        <a:t>Clase AC</a:t>
-                      </a:r>
-                      <a:endParaRPr lang="es-AR" sz="1100" b="0" i="0" u="none" strike="noStrike">
-                        <a:solidFill>
-                          <a:srgbClr val="000000"/>
-                        </a:solidFill>
-                        <a:effectLst/>
-                        <a:latin typeface="Calibri"/>
-                      </a:endParaRPr>
-                    </a:p>
-                  </a:txBody>
-                  <a:tcPr marL="9525" marR="9525" marT="9525" marB="0" anchor="b"/>
-                </a:tc>
-                <a:tc>
-                  <a:txBody>
-                    <a:bodyPr/>
-                    <a:lstStyle/>
-                    <a:p>
-                      <a:pPr algn="ctr" fontAlgn="b"/>
-                      <a:r>
-                        <a:rPr lang="es-AR" sz="1100" u="none" strike="noStrike" dirty="0">
-                          <a:effectLst/>
-                        </a:rPr>
-                        <a:t>1</a:t>
-                      </a:r>
-                      <a:endParaRPr lang="es-AR" sz="1100" b="0" i="0" u="none" strike="noStrike" dirty="0">
-                        <a:solidFill>
-                          <a:srgbClr val="000000"/>
-                        </a:solidFill>
-                        <a:effectLst/>
-                        <a:latin typeface="Calibri"/>
-                      </a:endParaRPr>
-                    </a:p>
-                  </a:txBody>
-                  <a:tcPr marL="9525" marR="9525" marT="9525" marB="0" anchor="b"/>
+                  <a:tcPr marL="7803" marR="7803" marT="7803" marB="0" anchor="b"/>
                 </a:tc>
               </a:tr>
             </a:tbl>
@@ -6441,78 +6905,74 @@
           </a:extLst>
         </p:spPr>
       </p:pic>
+      <p:pic>
+        <p:nvPicPr>
+          <p:cNvPr id="2050" name="Picture 2"/>
+          <p:cNvPicPr>
+            <a:picLocks noChangeAspect="1" noChangeArrowheads="1"/>
+          </p:cNvPicPr>
+          <p:nvPr/>
+        </p:nvPicPr>
+        <p:blipFill>
+          <a:blip r:embed="rId9">
+            <a:extLst>
+              <a:ext uri="{28A0092B-C50C-407E-A947-70E740481C1C}">
+                <a14:useLocalDpi xmlns:a14="http://schemas.microsoft.com/office/drawing/2010/main" val="0"/>
+              </a:ext>
+            </a:extLst>
+          </a:blip>
+          <a:srcRect/>
+          <a:stretch>
+            <a:fillRect/>
+          </a:stretch>
+        </p:blipFill>
+        <p:spPr bwMode="auto">
+          <a:xfrm>
+            <a:off x="3779912" y="4897169"/>
+            <a:ext cx="1760612" cy="1235056"/>
+          </a:xfrm>
+          <a:prstGeom prst="rect">
+            <a:avLst/>
+          </a:prstGeom>
+          <a:noFill/>
+          <a:ln>
+            <a:noFill/>
+          </a:ln>
+          <a:effectLst/>
+          <a:extLst>
+            <a:ext uri="{909E8E84-426E-40DD-AFC4-6F175D3DCCD1}">
+              <a14:hiddenFill xmlns:a14="http://schemas.microsoft.com/office/drawing/2010/main">
+                <a:solidFill>
+                  <a:schemeClr val="accent1"/>
+                </a:solidFill>
+              </a14:hiddenFill>
+            </a:ext>
+            <a:ext uri="{91240B29-F687-4F45-9708-019B960494DF}">
+              <a14:hiddenLine xmlns:a14="http://schemas.microsoft.com/office/drawing/2010/main" w="9525">
+                <a:solidFill>
+                  <a:schemeClr val="tx1"/>
+                </a:solidFill>
+                <a:miter lim="800000"/>
+                <a:headEnd/>
+                <a:tailEnd/>
+              </a14:hiddenLine>
+            </a:ext>
+            <a:ext uri="{AF507438-7753-43E0-B8FC-AC1667EBCBE1}">
+              <a14:hiddenEffects xmlns:a14="http://schemas.microsoft.com/office/drawing/2010/main">
+                <a:effectLst>
+                  <a:outerShdw dist="35921" dir="2700000" algn="ctr" rotWithShape="0">
+                    <a:schemeClr val="bg2"/>
+                  </a:outerShdw>
+                </a:effectLst>
+              </a14:hiddenEffects>
+            </a:ext>
+          </a:extLst>
+        </p:spPr>
+      </p:pic>
     </p:spTree>
     <p:extLst>
       <p:ext uri="{BB962C8B-B14F-4D97-AF65-F5344CB8AC3E}">
         <p14:creationId xmlns:p14="http://schemas.microsoft.com/office/powerpoint/2010/main" val="3639440012"/>
-      </p:ext>
-    </p:extLst>
-  </p:cSld>
-  <p:clrMapOvr>
-    <a:masterClrMapping/>
-  </p:clrMapOvr>
-</p:sld>
-</file>
-
-<file path=ppt/slides/slide6.xml><?xml version="1.0" encoding="utf-8"?>
-<p:sld xmlns:a="http://schemas.openxmlformats.org/drawingml/2006/main" xmlns:r="http://schemas.openxmlformats.org/officeDocument/2006/relationships" xmlns:p="http://schemas.openxmlformats.org/presentationml/2006/main">
-  <p:cSld>
-    <p:spTree>
-      <p:nvGrpSpPr>
-        <p:cNvPr id="1" name=""/>
-        <p:cNvGrpSpPr/>
-        <p:nvPr/>
-      </p:nvGrpSpPr>
-      <p:grpSpPr>
-        <a:xfrm>
-          <a:off x="0" y="0"/>
-          <a:ext cx="0" cy="0"/>
-          <a:chOff x="0" y="0"/>
-          <a:chExt cx="0" cy="0"/>
-        </a:xfrm>
-      </p:grpSpPr>
-      <p:sp>
-        <p:nvSpPr>
-          <p:cNvPr id="2" name="1 Título"/>
-          <p:cNvSpPr>
-            <a:spLocks noGrp="1"/>
-          </p:cNvSpPr>
-          <p:nvPr>
-            <p:ph type="title"/>
-          </p:nvPr>
-        </p:nvSpPr>
-        <p:spPr/>
-        <p:txBody>
-          <a:bodyPr/>
-          <a:lstStyle/>
-          <a:p>
-            <a:endParaRPr lang="es-AR"/>
-          </a:p>
-        </p:txBody>
-      </p:sp>
-      <p:sp>
-        <p:nvSpPr>
-          <p:cNvPr id="3" name="2 Marcador de contenido"/>
-          <p:cNvSpPr>
-            <a:spLocks noGrp="1"/>
-          </p:cNvSpPr>
-          <p:nvPr>
-            <p:ph idx="1"/>
-          </p:nvPr>
-        </p:nvSpPr>
-        <p:spPr/>
-        <p:txBody>
-          <a:bodyPr/>
-          <a:lstStyle/>
-          <a:p>
-            <a:endParaRPr lang="es-AR"/>
-          </a:p>
-        </p:txBody>
-      </p:sp>
-    </p:spTree>
-    <p:extLst>
-      <p:ext uri="{BB962C8B-B14F-4D97-AF65-F5344CB8AC3E}">
-        <p14:creationId xmlns:p14="http://schemas.microsoft.com/office/powerpoint/2010/main" val="202900502"/>
       </p:ext>
     </p:extLst>
   </p:cSld>

</xml_diff>

<commit_message>
imágenes agregadas a ppt (manguera contra incendio, acceso restringido y cuide la limpieza)
</commit_message>
<xml_diff>
--- a/Seguridad-Higiene/Trabajo de Higiene y Seguridad.pptx
+++ b/Seguridad-Higiene/Trabajo de Higiene y Seguridad.pptx
@@ -292,7 +292,7 @@
           <a:p>
             <a:fld id="{62B2C0FA-29D3-4885-90FF-F9585BE76E74}" type="datetimeFigureOut">
               <a:rPr lang="es-AR" smtClean="0"/>
-              <a:t>11/10/2012</a:t>
+              <a:t>25/10/2012</a:t>
             </a:fld>
             <a:endParaRPr lang="es-AR"/>
           </a:p>
@@ -462,7 +462,7 @@
           <a:p>
             <a:fld id="{62B2C0FA-29D3-4885-90FF-F9585BE76E74}" type="datetimeFigureOut">
               <a:rPr lang="es-AR" smtClean="0"/>
-              <a:t>11/10/2012</a:t>
+              <a:t>25/10/2012</a:t>
             </a:fld>
             <a:endParaRPr lang="es-AR"/>
           </a:p>
@@ -642,7 +642,7 @@
           <a:p>
             <a:fld id="{62B2C0FA-29D3-4885-90FF-F9585BE76E74}" type="datetimeFigureOut">
               <a:rPr lang="es-AR" smtClean="0"/>
-              <a:t>11/10/2012</a:t>
+              <a:t>25/10/2012</a:t>
             </a:fld>
             <a:endParaRPr lang="es-AR"/>
           </a:p>
@@ -812,7 +812,7 @@
           <a:p>
             <a:fld id="{62B2C0FA-29D3-4885-90FF-F9585BE76E74}" type="datetimeFigureOut">
               <a:rPr lang="es-AR" smtClean="0"/>
-              <a:t>11/10/2012</a:t>
+              <a:t>25/10/2012</a:t>
             </a:fld>
             <a:endParaRPr lang="es-AR"/>
           </a:p>
@@ -1058,7 +1058,7 @@
           <a:p>
             <a:fld id="{62B2C0FA-29D3-4885-90FF-F9585BE76E74}" type="datetimeFigureOut">
               <a:rPr lang="es-AR" smtClean="0"/>
-              <a:t>11/10/2012</a:t>
+              <a:t>25/10/2012</a:t>
             </a:fld>
             <a:endParaRPr lang="es-AR"/>
           </a:p>
@@ -1346,7 +1346,7 @@
           <a:p>
             <a:fld id="{62B2C0FA-29D3-4885-90FF-F9585BE76E74}" type="datetimeFigureOut">
               <a:rPr lang="es-AR" smtClean="0"/>
-              <a:t>11/10/2012</a:t>
+              <a:t>25/10/2012</a:t>
             </a:fld>
             <a:endParaRPr lang="es-AR"/>
           </a:p>
@@ -1768,7 +1768,7 @@
           <a:p>
             <a:fld id="{62B2C0FA-29D3-4885-90FF-F9585BE76E74}" type="datetimeFigureOut">
               <a:rPr lang="es-AR" smtClean="0"/>
-              <a:t>11/10/2012</a:t>
+              <a:t>25/10/2012</a:t>
             </a:fld>
             <a:endParaRPr lang="es-AR"/>
           </a:p>
@@ -1886,7 +1886,7 @@
           <a:p>
             <a:fld id="{62B2C0FA-29D3-4885-90FF-F9585BE76E74}" type="datetimeFigureOut">
               <a:rPr lang="es-AR" smtClean="0"/>
-              <a:t>11/10/2012</a:t>
+              <a:t>25/10/2012</a:t>
             </a:fld>
             <a:endParaRPr lang="es-AR"/>
           </a:p>
@@ -1981,7 +1981,7 @@
           <a:p>
             <a:fld id="{62B2C0FA-29D3-4885-90FF-F9585BE76E74}" type="datetimeFigureOut">
               <a:rPr lang="es-AR" smtClean="0"/>
-              <a:t>11/10/2012</a:t>
+              <a:t>25/10/2012</a:t>
             </a:fld>
             <a:endParaRPr lang="es-AR"/>
           </a:p>
@@ -2258,7 +2258,7 @@
           <a:p>
             <a:fld id="{62B2C0FA-29D3-4885-90FF-F9585BE76E74}" type="datetimeFigureOut">
               <a:rPr lang="es-AR" smtClean="0"/>
-              <a:t>11/10/2012</a:t>
+              <a:t>25/10/2012</a:t>
             </a:fld>
             <a:endParaRPr lang="es-AR"/>
           </a:p>
@@ -2511,7 +2511,7 @@
           <a:p>
             <a:fld id="{62B2C0FA-29D3-4885-90FF-F9585BE76E74}" type="datetimeFigureOut">
               <a:rPr lang="es-AR" smtClean="0"/>
-              <a:t>11/10/2012</a:t>
+              <a:t>25/10/2012</a:t>
             </a:fld>
             <a:endParaRPr lang="es-AR"/>
           </a:p>
@@ -2748,7 +2748,7 @@
           <a:p>
             <a:fld id="{62B2C0FA-29D3-4885-90FF-F9585BE76E74}" type="datetimeFigureOut">
               <a:rPr lang="es-AR" smtClean="0"/>
-              <a:t>11/10/2012</a:t>
+              <a:t>25/10/2012</a:t>
             </a:fld>
             <a:endParaRPr lang="es-AR"/>
           </a:p>
@@ -3669,13 +3669,7 @@
                         <a:rPr lang="pt-BR" sz="1600" u="none" strike="noStrike" dirty="0" smtClean="0">
                           <a:effectLst/>
                         </a:rPr>
-                        <a:t>líquidos</a:t>
-                      </a:r>
-                      <a:r>
-                        <a:rPr lang="pt-BR" sz="1600" u="none" strike="noStrike" dirty="0" smtClean="0">
-                          <a:effectLst/>
-                        </a:rPr>
-                        <a:t>: pinturas</a:t>
+                        <a:t>líquidos: pinturas</a:t>
                       </a:r>
                       <a:r>
                         <a:rPr lang="pt-BR" sz="1600" u="none" strike="noStrike" dirty="0">
@@ -6420,41 +6414,6 @@
           <a:chExt cx="0" cy="0"/>
         </a:xfrm>
       </p:grpSpPr>
-      <p:sp>
-        <p:nvSpPr>
-          <p:cNvPr id="2" name="1 Título"/>
-          <p:cNvSpPr>
-            <a:spLocks noGrp="1"/>
-          </p:cNvSpPr>
-          <p:nvPr>
-            <p:ph type="title"/>
-          </p:nvPr>
-        </p:nvSpPr>
-        <p:spPr/>
-        <p:txBody>
-          <a:bodyPr/>
-          <a:lstStyle/>
-          <a:p>
-            <a:r>
-              <a:rPr lang="es-AR" b="1" dirty="0" smtClean="0">
-                <a:solidFill>
-                  <a:schemeClr val="tx2">
-                    <a:lumMod val="75000"/>
-                  </a:schemeClr>
-                </a:solidFill>
-              </a:rPr>
-              <a:t>Señalización</a:t>
-            </a:r>
-            <a:endParaRPr lang="es-AR" b="1" dirty="0">
-              <a:solidFill>
-                <a:schemeClr val="tx2">
-                  <a:lumMod val="75000"/>
-                </a:schemeClr>
-              </a:solidFill>
-            </a:endParaRPr>
-          </a:p>
-        </p:txBody>
-      </p:sp>
       <p:pic>
         <p:nvPicPr>
           <p:cNvPr id="3076" name="Picture 4"/>
@@ -6480,7 +6439,7 @@
         </p:blipFill>
         <p:spPr bwMode="auto">
           <a:xfrm>
-            <a:off x="497722" y="1440482"/>
+            <a:off x="2948887" y="332656"/>
             <a:ext cx="2294012" cy="1097444"/>
           </a:xfrm>
           <a:prstGeom prst="rect">
@@ -6544,7 +6503,7 @@
         </p:blipFill>
         <p:spPr bwMode="auto">
           <a:xfrm>
-            <a:off x="7551863" y="1412776"/>
+            <a:off x="6024625" y="2500136"/>
             <a:ext cx="1053775" cy="1501017"/>
           </a:xfrm>
           <a:prstGeom prst="rect">
@@ -6608,7 +6567,7 @@
         </p:blipFill>
         <p:spPr bwMode="auto">
           <a:xfrm>
-            <a:off x="611560" y="3215346"/>
+            <a:off x="491328" y="473687"/>
             <a:ext cx="1778309" cy="949952"/>
           </a:xfrm>
           <a:prstGeom prst="rect">
@@ -6672,8 +6631,8 @@
         </p:blipFill>
         <p:spPr bwMode="auto">
           <a:xfrm>
-            <a:off x="1009196" y="5123444"/>
-            <a:ext cx="1271067" cy="1271067"/>
+            <a:off x="251520" y="4089025"/>
+            <a:ext cx="1394431" cy="1394431"/>
           </a:xfrm>
           <a:prstGeom prst="rect">
             <a:avLst/>
@@ -6736,7 +6695,7 @@
         </p:blipFill>
         <p:spPr bwMode="auto">
           <a:xfrm>
-            <a:off x="7524328" y="3405331"/>
+            <a:off x="7380312" y="536980"/>
             <a:ext cx="1098872" cy="1519935"/>
           </a:xfrm>
           <a:prstGeom prst="rect">
@@ -6800,7 +6759,7 @@
         </p:blipFill>
         <p:spPr bwMode="auto">
           <a:xfrm>
-            <a:off x="7563643" y="5229200"/>
+            <a:off x="3566115" y="1541723"/>
             <a:ext cx="1059557" cy="1059557"/>
           </a:xfrm>
           <a:prstGeom prst="rect">
@@ -6864,7 +6823,7 @@
         </p:blipFill>
         <p:spPr bwMode="auto">
           <a:xfrm>
-            <a:off x="3779912" y="2924944"/>
+            <a:off x="5568851" y="4180535"/>
             <a:ext cx="1965325" cy="1500187"/>
           </a:xfrm>
           <a:prstGeom prst="rect">
@@ -6928,7 +6887,7 @@
         </p:blipFill>
         <p:spPr bwMode="auto">
           <a:xfrm>
-            <a:off x="3779912" y="4897169"/>
+            <a:off x="3374433" y="4235968"/>
             <a:ext cx="1760612" cy="1235056"/>
           </a:xfrm>
           <a:prstGeom prst="rect">
@@ -6967,6 +6926,156 @@
               </a14:hiddenEffects>
             </a:ext>
           </a:extLst>
+        </p:spPr>
+      </p:pic>
+      <p:pic>
+        <p:nvPicPr>
+          <p:cNvPr id="3" name="2 Imagen"/>
+          <p:cNvPicPr>
+            <a:picLocks noChangeAspect="1"/>
+          </p:cNvPicPr>
+          <p:nvPr/>
+        </p:nvPicPr>
+        <p:blipFill>
+          <a:blip r:embed="rId10" cstate="print">
+            <a:extLst>
+              <a:ext uri="{28A0092B-C50C-407E-A947-70E740481C1C}">
+                <a14:useLocalDpi xmlns:a14="http://schemas.microsoft.com/office/drawing/2010/main" val="0"/>
+              </a:ext>
+            </a:extLst>
+          </a:blip>
+          <a:stretch>
+            <a:fillRect/>
+          </a:stretch>
+        </p:blipFill>
+        <p:spPr>
+          <a:xfrm>
+            <a:off x="5843998" y="471081"/>
+            <a:ext cx="1189368" cy="1651735"/>
+          </a:xfrm>
+          <a:prstGeom prst="rect">
+            <a:avLst/>
+          </a:prstGeom>
+        </p:spPr>
+      </p:pic>
+      <p:pic>
+        <p:nvPicPr>
+          <p:cNvPr id="5" name="4 Imagen"/>
+          <p:cNvPicPr>
+            <a:picLocks noChangeAspect="1"/>
+          </p:cNvPicPr>
+          <p:nvPr/>
+        </p:nvPicPr>
+        <p:blipFill>
+          <a:blip r:embed="rId11">
+            <a:extLst>
+              <a:ext uri="{28A0092B-C50C-407E-A947-70E740481C1C}">
+                <a14:useLocalDpi xmlns:a14="http://schemas.microsoft.com/office/drawing/2010/main" val="0"/>
+              </a:ext>
+            </a:extLst>
+          </a:blip>
+          <a:stretch>
+            <a:fillRect/>
+          </a:stretch>
+        </p:blipFill>
+        <p:spPr>
+          <a:xfrm>
+            <a:off x="401047" y="2147606"/>
+            <a:ext cx="1095375" cy="1095375"/>
+          </a:xfrm>
+          <a:prstGeom prst="rect">
+            <a:avLst/>
+          </a:prstGeom>
+        </p:spPr>
+      </p:pic>
+      <p:pic>
+        <p:nvPicPr>
+          <p:cNvPr id="6" name="5 Imagen"/>
+          <p:cNvPicPr>
+            <a:picLocks noChangeAspect="1"/>
+          </p:cNvPicPr>
+          <p:nvPr/>
+        </p:nvPicPr>
+        <p:blipFill>
+          <a:blip r:embed="rId12">
+            <a:extLst>
+              <a:ext uri="{28A0092B-C50C-407E-A947-70E740481C1C}">
+                <a14:useLocalDpi xmlns:a14="http://schemas.microsoft.com/office/drawing/2010/main" val="0"/>
+              </a:ext>
+            </a:extLst>
+          </a:blip>
+          <a:stretch>
+            <a:fillRect/>
+          </a:stretch>
+        </p:blipFill>
+        <p:spPr>
+          <a:xfrm>
+            <a:off x="1645951" y="2104743"/>
+            <a:ext cx="1181100" cy="1181100"/>
+          </a:xfrm>
+          <a:prstGeom prst="rect">
+            <a:avLst/>
+          </a:prstGeom>
+        </p:spPr>
+      </p:pic>
+      <p:pic>
+        <p:nvPicPr>
+          <p:cNvPr id="7" name="6 Imagen"/>
+          <p:cNvPicPr>
+            <a:picLocks noChangeAspect="1"/>
+          </p:cNvPicPr>
+          <p:nvPr/>
+        </p:nvPicPr>
+        <p:blipFill>
+          <a:blip r:embed="rId13">
+            <a:extLst>
+              <a:ext uri="{28A0092B-C50C-407E-A947-70E740481C1C}">
+                <a14:useLocalDpi xmlns:a14="http://schemas.microsoft.com/office/drawing/2010/main" val="0"/>
+              </a:ext>
+            </a:extLst>
+          </a:blip>
+          <a:stretch>
+            <a:fillRect/>
+          </a:stretch>
+        </p:blipFill>
+        <p:spPr>
+          <a:xfrm>
+            <a:off x="3452957" y="2906131"/>
+            <a:ext cx="1285875" cy="638175"/>
+          </a:xfrm>
+          <a:prstGeom prst="rect">
+            <a:avLst/>
+          </a:prstGeom>
+        </p:spPr>
+      </p:pic>
+      <p:pic>
+        <p:nvPicPr>
+          <p:cNvPr id="8" name="7 Imagen"/>
+          <p:cNvPicPr>
+            <a:picLocks noChangeAspect="1"/>
+          </p:cNvPicPr>
+          <p:nvPr/>
+        </p:nvPicPr>
+        <p:blipFill>
+          <a:blip r:embed="rId14">
+            <a:extLst>
+              <a:ext uri="{28A0092B-C50C-407E-A947-70E740481C1C}">
+                <a14:useLocalDpi xmlns:a14="http://schemas.microsoft.com/office/drawing/2010/main" val="0"/>
+              </a:ext>
+            </a:extLst>
+          </a:blip>
+          <a:stretch>
+            <a:fillRect/>
+          </a:stretch>
+        </p:blipFill>
+        <p:spPr>
+          <a:xfrm>
+            <a:off x="1755097" y="4095372"/>
+            <a:ext cx="1431882" cy="1431882"/>
+          </a:xfrm>
+          <a:prstGeom prst="rect">
+            <a:avLst/>
+          </a:prstGeom>
         </p:spPr>
       </p:pic>
     </p:spTree>

</xml_diff>